<commit_message>
"Final" version of presentation slides
</commit_message>
<xml_diff>
--- a/documents/Presentation BGP.pptx
+++ b/documents/Presentation BGP.pptx
@@ -9,16 +9,14 @@
     <p:sldId id="272" r:id="rId3"/>
     <p:sldId id="273" r:id="rId4"/>
     <p:sldId id="257" r:id="rId5"/>
-    <p:sldId id="258" r:id="rId6"/>
-    <p:sldId id="259" r:id="rId7"/>
-    <p:sldId id="260" r:id="rId8"/>
-    <p:sldId id="261" r:id="rId9"/>
-    <p:sldId id="264" r:id="rId10"/>
-    <p:sldId id="265" r:id="rId11"/>
-    <p:sldId id="266" r:id="rId12"/>
-    <p:sldId id="275" r:id="rId13"/>
-    <p:sldId id="267" r:id="rId14"/>
-    <p:sldId id="268" r:id="rId15"/>
+    <p:sldId id="259" r:id="rId6"/>
+    <p:sldId id="260" r:id="rId7"/>
+    <p:sldId id="264" r:id="rId8"/>
+    <p:sldId id="265" r:id="rId9"/>
+    <p:sldId id="266" r:id="rId10"/>
+    <p:sldId id="275" r:id="rId11"/>
+    <p:sldId id="267" r:id="rId12"/>
+    <p:sldId id="268" r:id="rId13"/>
   </p:sldIdLst>
   <p:sldSz cx="9144000" cy="6858000" type="screen4x3"/>
   <p:notesSz cx="6858000" cy="9144000"/>
@@ -205,7 +203,7 @@
           </a:lstStyle>
           <a:p>
             <a:pPr algn="ctr" eaLnBrk="1" latinLnBrk="0" hangingPunct="1"/>
-            <a:endParaRPr kumimoji="0" lang="en-US"/>
+            <a:endParaRPr kumimoji="0" lang="en-US" dirty="0"/>
           </a:p>
         </p:txBody>
       </p:sp>
@@ -419,7 +417,7 @@
               <a:extLst/>
             </a:lstStyle>
             <a:p>
-              <a:endParaRPr kumimoji="0" lang="en-US"/>
+              <a:endParaRPr kumimoji="0" lang="en-US" dirty="0"/>
             </a:p>
           </p:txBody>
         </p:sp>
@@ -501,7 +499,7 @@
               <a:extLst/>
             </a:lstStyle>
             <a:p>
-              <a:endParaRPr kumimoji="0" lang="en-US"/>
+              <a:endParaRPr kumimoji="0" lang="en-US" dirty="0"/>
             </a:p>
           </p:txBody>
         </p:sp>
@@ -661,7 +659,7 @@
             </a:lstStyle>
             <a:p>
               <a:pPr algn="ctr" eaLnBrk="1" latinLnBrk="0" hangingPunct="1"/>
-              <a:endParaRPr kumimoji="0" lang="en-US"/>
+              <a:endParaRPr kumimoji="0" lang="en-US" dirty="0"/>
             </a:p>
           </p:txBody>
         </p:sp>
@@ -747,7 +745,7 @@
             <a:fld id="{544213AF-26F6-41FA-8D85-E2C5388D6E58}" type="datetimeFigureOut">
               <a:rPr lang="en-US" smtClean="0"/>
               <a:pPr eaLnBrk="1" latinLnBrk="0" hangingPunct="1"/>
-              <a:t>04-Dec-2014</a:t>
+              <a:t>12/4/2014</a:t>
             </a:fld>
             <a:endParaRPr lang="en-US" dirty="0">
               <a:solidFill>
@@ -783,7 +781,7 @@
             <a:extLst/>
           </a:lstStyle>
           <a:p>
-            <a:endParaRPr kumimoji="0" lang="en-US">
+            <a:endParaRPr kumimoji="0" lang="en-US" dirty="0">
               <a:solidFill>
                 <a:schemeClr val="accent1">
                   <a:tint val="20000"/>
@@ -958,9 +956,9 @@
           <a:p>
             <a:fld id="{8F1B69E8-23E9-4C1F-AA2B-3C5BA6EDBEAE}" type="datetimeFigureOut">
               <a:rPr lang="en-US" smtClean="0"/>
-              <a:t>04-Dec-2014</a:t>
+              <a:t>12/4/2014</a:t>
             </a:fld>
-            <a:endParaRPr lang="en-US"/>
+            <a:endParaRPr lang="en-US" dirty="0"/>
           </a:p>
         </p:txBody>
       </p:sp>
@@ -981,7 +979,7 @@
             <a:extLst/>
           </a:lstStyle>
           <a:p>
-            <a:endParaRPr lang="en-US"/>
+            <a:endParaRPr lang="en-US" dirty="0"/>
           </a:p>
         </p:txBody>
       </p:sp>
@@ -1006,7 +1004,7 @@
               <a:rPr lang="en-US" smtClean="0"/>
               <a:t>‹#›</a:t>
             </a:fld>
-            <a:endParaRPr lang="en-US"/>
+            <a:endParaRPr lang="en-US" dirty="0"/>
           </a:p>
         </p:txBody>
       </p:sp>
@@ -1143,9 +1141,9 @@
           <a:p>
             <a:fld id="{8F1B69E8-23E9-4C1F-AA2B-3C5BA6EDBEAE}" type="datetimeFigureOut">
               <a:rPr lang="en-US" smtClean="0"/>
-              <a:t>04-Dec-2014</a:t>
+              <a:t>12/4/2014</a:t>
             </a:fld>
-            <a:endParaRPr lang="en-US"/>
+            <a:endParaRPr lang="en-US" dirty="0"/>
           </a:p>
         </p:txBody>
       </p:sp>
@@ -1166,7 +1164,7 @@
             <a:extLst/>
           </a:lstStyle>
           <a:p>
-            <a:endParaRPr lang="en-US"/>
+            <a:endParaRPr lang="en-US" dirty="0"/>
           </a:p>
         </p:txBody>
       </p:sp>
@@ -1191,7 +1189,7 @@
               <a:rPr lang="en-US" smtClean="0"/>
               <a:t>‹#›</a:t>
             </a:fld>
-            <a:endParaRPr lang="en-US"/>
+            <a:endParaRPr lang="en-US" dirty="0"/>
           </a:p>
         </p:txBody>
       </p:sp>
@@ -1293,9 +1291,9 @@
           <a:p>
             <a:fld id="{8F1B69E8-23E9-4C1F-AA2B-3C5BA6EDBEAE}" type="datetimeFigureOut">
               <a:rPr lang="en-US" smtClean="0"/>
-              <a:t>04-Dec-2014</a:t>
+              <a:t>12/4/2014</a:t>
             </a:fld>
-            <a:endParaRPr lang="en-US"/>
+            <a:endParaRPr lang="en-US" dirty="0"/>
           </a:p>
         </p:txBody>
       </p:sp>
@@ -1316,7 +1314,7 @@
             <a:extLst/>
           </a:lstStyle>
           <a:p>
-            <a:endParaRPr lang="en-US"/>
+            <a:endParaRPr lang="en-US" dirty="0"/>
           </a:p>
         </p:txBody>
       </p:sp>
@@ -1341,7 +1339,7 @@
               <a:rPr lang="en-US" smtClean="0"/>
               <a:t>‹#›</a:t>
             </a:fld>
-            <a:endParaRPr lang="en-US"/>
+            <a:endParaRPr lang="en-US" dirty="0"/>
           </a:p>
         </p:txBody>
       </p:sp>
@@ -1550,9 +1548,9 @@
             <a:fld id="{544213AF-26F6-41FA-8D85-E2C5388D6E58}" type="datetimeFigureOut">
               <a:rPr lang="en-US" smtClean="0"/>
               <a:pPr eaLnBrk="1" latinLnBrk="0" hangingPunct="1"/>
-              <a:t>04-Dec-2014</a:t>
+              <a:t>12/4/2014</a:t>
             </a:fld>
-            <a:endParaRPr lang="en-US"/>
+            <a:endParaRPr lang="en-US" dirty="0"/>
           </a:p>
         </p:txBody>
       </p:sp>
@@ -1573,7 +1571,7 @@
             <a:extLst/>
           </a:lstStyle>
           <a:p>
-            <a:endParaRPr kumimoji="0" lang="en-US"/>
+            <a:endParaRPr kumimoji="0" lang="en-US" dirty="0"/>
           </a:p>
         </p:txBody>
       </p:sp>
@@ -1599,7 +1597,7 @@
               <a:pPr eaLnBrk="1" latinLnBrk="0" hangingPunct="1"/>
               <a:t>‹#›</a:t>
             </a:fld>
-            <a:endParaRPr kumimoji="0" lang="en-US"/>
+            <a:endParaRPr kumimoji="0" lang="en-US" dirty="0"/>
           </a:p>
         </p:txBody>
       </p:sp>
@@ -1679,7 +1677,7 @@
           </a:lstStyle>
           <a:p>
             <a:pPr algn="l" eaLnBrk="1" latinLnBrk="0" hangingPunct="1"/>
-            <a:endParaRPr kumimoji="0" lang="en-US"/>
+            <a:endParaRPr kumimoji="0" lang="en-US" dirty="0"/>
           </a:p>
         </p:txBody>
       </p:sp>
@@ -1759,7 +1757,7 @@
           </a:lstStyle>
           <a:p>
             <a:pPr algn="l" eaLnBrk="1" latinLnBrk="0" hangingPunct="1"/>
-            <a:endParaRPr kumimoji="0" lang="en-US"/>
+            <a:endParaRPr kumimoji="0" lang="en-US" dirty="0"/>
           </a:p>
         </p:txBody>
       </p:sp>
@@ -1960,9 +1958,9 @@
           <a:p>
             <a:fld id="{8F1B69E8-23E9-4C1F-AA2B-3C5BA6EDBEAE}" type="datetimeFigureOut">
               <a:rPr lang="en-US" smtClean="0"/>
-              <a:t>04-Dec-2014</a:t>
+              <a:t>12/4/2014</a:t>
             </a:fld>
-            <a:endParaRPr lang="en-US"/>
+            <a:endParaRPr lang="en-US" dirty="0"/>
           </a:p>
         </p:txBody>
       </p:sp>
@@ -1983,7 +1981,7 @@
             <a:extLst/>
           </a:lstStyle>
           <a:p>
-            <a:endParaRPr lang="en-US"/>
+            <a:endParaRPr lang="en-US" dirty="0"/>
           </a:p>
         </p:txBody>
       </p:sp>
@@ -2008,7 +2006,7 @@
               <a:rPr lang="en-US" smtClean="0"/>
               <a:t>‹#›</a:t>
             </a:fld>
-            <a:endParaRPr lang="en-US"/>
+            <a:endParaRPr lang="en-US" dirty="0"/>
           </a:p>
         </p:txBody>
       </p:sp>
@@ -2406,9 +2404,9 @@
           <a:p>
             <a:fld id="{8F1B69E8-23E9-4C1F-AA2B-3C5BA6EDBEAE}" type="datetimeFigureOut">
               <a:rPr lang="en-US" smtClean="0"/>
-              <a:t>04-Dec-2014</a:t>
+              <a:t>12/4/2014</a:t>
             </a:fld>
-            <a:endParaRPr lang="en-US"/>
+            <a:endParaRPr lang="en-US" dirty="0"/>
           </a:p>
         </p:txBody>
       </p:sp>
@@ -2429,7 +2427,7 @@
             <a:extLst/>
           </a:lstStyle>
           <a:p>
-            <a:endParaRPr lang="en-US"/>
+            <a:endParaRPr lang="en-US" dirty="0"/>
           </a:p>
         </p:txBody>
       </p:sp>
@@ -2454,7 +2452,7 @@
               <a:rPr lang="en-US" smtClean="0"/>
               <a:t>‹#›</a:t>
             </a:fld>
-            <a:endParaRPr lang="en-US"/>
+            <a:endParaRPr lang="en-US" dirty="0"/>
           </a:p>
         </p:txBody>
       </p:sp>
@@ -2507,9 +2505,9 @@
           <a:p>
             <a:fld id="{8F1B69E8-23E9-4C1F-AA2B-3C5BA6EDBEAE}" type="datetimeFigureOut">
               <a:rPr lang="en-US" smtClean="0"/>
-              <a:t>04-Dec-2014</a:t>
+              <a:t>12/4/2014</a:t>
             </a:fld>
-            <a:endParaRPr lang="en-US"/>
+            <a:endParaRPr lang="en-US" dirty="0"/>
           </a:p>
         </p:txBody>
       </p:sp>
@@ -2530,7 +2528,7 @@
             <a:extLst/>
           </a:lstStyle>
           <a:p>
-            <a:endParaRPr lang="en-US"/>
+            <a:endParaRPr lang="en-US" dirty="0"/>
           </a:p>
         </p:txBody>
       </p:sp>
@@ -2555,7 +2553,7 @@
               <a:rPr lang="en-US" smtClean="0"/>
               <a:t>‹#›</a:t>
             </a:fld>
-            <a:endParaRPr lang="en-US"/>
+            <a:endParaRPr lang="en-US" dirty="0"/>
           </a:p>
         </p:txBody>
       </p:sp>
@@ -2628,9 +2626,9 @@
           <a:p>
             <a:fld id="{8F1B69E8-23E9-4C1F-AA2B-3C5BA6EDBEAE}" type="datetimeFigureOut">
               <a:rPr lang="en-US" smtClean="0"/>
-              <a:t>04-Dec-2014</a:t>
+              <a:t>12/4/2014</a:t>
             </a:fld>
-            <a:endParaRPr lang="en-US"/>
+            <a:endParaRPr lang="en-US" dirty="0"/>
           </a:p>
         </p:txBody>
       </p:sp>
@@ -2651,7 +2649,7 @@
             <a:extLst/>
           </a:lstStyle>
           <a:p>
-            <a:endParaRPr lang="en-US"/>
+            <a:endParaRPr lang="en-US" dirty="0"/>
           </a:p>
         </p:txBody>
       </p:sp>
@@ -2676,7 +2674,7 @@
               <a:rPr lang="en-US" smtClean="0"/>
               <a:t>‹#›</a:t>
             </a:fld>
-            <a:endParaRPr lang="en-US"/>
+            <a:endParaRPr lang="en-US" dirty="0"/>
           </a:p>
         </p:txBody>
       </p:sp>
@@ -2902,9 +2900,9 @@
           <a:p>
             <a:fld id="{8F1B69E8-23E9-4C1F-AA2B-3C5BA6EDBEAE}" type="datetimeFigureOut">
               <a:rPr lang="en-US" smtClean="0"/>
-              <a:t>04-Dec-2014</a:t>
+              <a:t>12/4/2014</a:t>
             </a:fld>
-            <a:endParaRPr lang="en-US"/>
+            <a:endParaRPr lang="en-US" dirty="0"/>
           </a:p>
         </p:txBody>
       </p:sp>
@@ -2925,7 +2923,7 @@
             <a:extLst/>
           </a:lstStyle>
           <a:p>
-            <a:endParaRPr lang="en-US"/>
+            <a:endParaRPr lang="en-US" dirty="0"/>
           </a:p>
         </p:txBody>
       </p:sp>
@@ -2950,7 +2948,7 @@
               <a:rPr lang="en-US" smtClean="0"/>
               <a:t>‹#›</a:t>
             </a:fld>
-            <a:endParaRPr lang="en-US"/>
+            <a:endParaRPr lang="en-US" dirty="0"/>
           </a:p>
         </p:txBody>
       </p:sp>
@@ -3074,7 +3072,7 @@
           </a:lstStyle>
           <a:p>
             <a:r>
-              <a:rPr kumimoji="0" lang="en-US" smtClean="0"/>
+              <a:rPr kumimoji="0" lang="en-US" dirty="0" smtClean="0"/>
               <a:t>Click icon to add picture</a:t>
             </a:r>
             <a:endParaRPr kumimoji="0" lang="en-US" dirty="0"/>
@@ -3107,9 +3105,9 @@
           <a:p>
             <a:fld id="{8F1B69E8-23E9-4C1F-AA2B-3C5BA6EDBEAE}" type="datetimeFigureOut">
               <a:rPr lang="en-US" smtClean="0"/>
-              <a:t>04-Dec-2014</a:t>
+              <a:t>12/4/2014</a:t>
             </a:fld>
-            <a:endParaRPr lang="en-US"/>
+            <a:endParaRPr lang="en-US" dirty="0"/>
           </a:p>
         </p:txBody>
       </p:sp>
@@ -3142,7 +3140,7 @@
             <a:extLst/>
           </a:lstStyle>
           <a:p>
-            <a:endParaRPr lang="en-US"/>
+            <a:endParaRPr lang="en-US" dirty="0"/>
           </a:p>
         </p:txBody>
       </p:sp>
@@ -3174,7 +3172,7 @@
               <a:rPr lang="en-US" smtClean="0"/>
               <a:t>‹#›</a:t>
             </a:fld>
-            <a:endParaRPr lang="en-US"/>
+            <a:endParaRPr lang="en-US" dirty="0"/>
           </a:p>
         </p:txBody>
       </p:sp>
@@ -3306,7 +3304,7 @@
             <a:extLst/>
           </a:lstStyle>
           <a:p>
-            <a:endParaRPr kumimoji="0" lang="en-US"/>
+            <a:endParaRPr kumimoji="0" lang="en-US" dirty="0"/>
           </a:p>
         </p:txBody>
       </p:sp>
@@ -3388,7 +3386,7 @@
             <a:extLst/>
           </a:lstStyle>
           <a:p>
-            <a:endParaRPr kumimoji="0" lang="en-US"/>
+            <a:endParaRPr kumimoji="0" lang="en-US" dirty="0"/>
           </a:p>
         </p:txBody>
       </p:sp>
@@ -3499,7 +3497,7 @@
           </a:lstStyle>
           <a:p>
             <a:pPr algn="ctr" eaLnBrk="1" latinLnBrk="0" hangingPunct="1"/>
-            <a:endParaRPr kumimoji="0" lang="en-US"/>
+            <a:endParaRPr kumimoji="0" lang="en-US" dirty="0"/>
           </a:p>
         </p:txBody>
       </p:sp>
@@ -3632,7 +3630,7 @@
           </a:lstStyle>
           <a:p>
             <a:pPr algn="l" eaLnBrk="1" latinLnBrk="0" hangingPunct="1"/>
-            <a:endParaRPr kumimoji="0" lang="en-US"/>
+            <a:endParaRPr kumimoji="0" lang="en-US" dirty="0"/>
           </a:p>
         </p:txBody>
       </p:sp>
@@ -3712,7 +3710,7 @@
           </a:lstStyle>
           <a:p>
             <a:pPr algn="l" eaLnBrk="1" latinLnBrk="0" hangingPunct="1"/>
-            <a:endParaRPr kumimoji="0" lang="en-US"/>
+            <a:endParaRPr kumimoji="0" lang="en-US" dirty="0"/>
           </a:p>
         </p:txBody>
       </p:sp>
@@ -3826,7 +3824,7 @@
             <a:extLst/>
           </a:lstStyle>
           <a:p>
-            <a:endParaRPr kumimoji="0" lang="en-US"/>
+            <a:endParaRPr kumimoji="0" lang="en-US" dirty="0"/>
           </a:p>
         </p:txBody>
       </p:sp>
@@ -3908,7 +3906,7 @@
             <a:extLst/>
           </a:lstStyle>
           <a:p>
-            <a:endParaRPr kumimoji="0" lang="en-US"/>
+            <a:endParaRPr kumimoji="0" lang="en-US" dirty="0"/>
           </a:p>
         </p:txBody>
       </p:sp>
@@ -4019,7 +4017,7 @@
           </a:lstStyle>
           <a:p>
             <a:pPr algn="ctr" eaLnBrk="1" latinLnBrk="0" hangingPunct="1"/>
-            <a:endParaRPr kumimoji="0" lang="en-US"/>
+            <a:endParaRPr kumimoji="0" lang="en-US" dirty="0"/>
           </a:p>
         </p:txBody>
       </p:sp>
@@ -4216,9 +4214,9 @@
           <a:p>
             <a:fld id="{8F1B69E8-23E9-4C1F-AA2B-3C5BA6EDBEAE}" type="datetimeFigureOut">
               <a:rPr lang="en-US" smtClean="0"/>
-              <a:t>04-Dec-2014</a:t>
+              <a:t>12/4/2014</a:t>
             </a:fld>
-            <a:endParaRPr lang="en-US"/>
+            <a:endParaRPr lang="en-US" dirty="0"/>
           </a:p>
         </p:txBody>
       </p:sp>
@@ -4254,7 +4252,7 @@
             <a:extLst/>
           </a:lstStyle>
           <a:p>
-            <a:endParaRPr lang="en-US"/>
+            <a:endParaRPr lang="en-US" dirty="0"/>
           </a:p>
         </p:txBody>
       </p:sp>
@@ -4294,7 +4292,7 @@
               <a:rPr lang="en-US" smtClean="0"/>
               <a:t>‹#›</a:t>
             </a:fld>
-            <a:endParaRPr lang="en-US"/>
+            <a:endParaRPr lang="en-US" dirty="0"/>
           </a:p>
         </p:txBody>
       </p:sp>
@@ -4761,7 +4759,7 @@
       </p:grpSpPr>
       <p:sp>
         <p:nvSpPr>
-          <p:cNvPr id="5" name="Vertical Text Placeholder 4"/>
+          <p:cNvPr id="3" name="Vertical Text Placeholder 2"/>
           <p:cNvSpPr>
             <a:spLocks noGrp="1"/>
           </p:cNvSpPr>
@@ -4771,197 +4769,141 @@
         </p:nvSpPr>
         <p:spPr>
           <a:xfrm>
-            <a:off x="171450" y="1417638"/>
-            <a:ext cx="8724900" cy="5173662"/>
+            <a:off x="237507" y="1481327"/>
+            <a:ext cx="8680862" cy="4719447"/>
           </a:xfrm>
         </p:spPr>
         <p:txBody>
           <a:bodyPr>
-            <a:normAutofit fontScale="62500" lnSpcReduction="20000"/>
+            <a:normAutofit fontScale="77500" lnSpcReduction="20000"/>
           </a:bodyPr>
           <a:lstStyle/>
           <a:p>
-            <a:pPr lvl="0"/>
-            <a:r>
-              <a:rPr lang="en-US" sz="2800" dirty="0" smtClean="0"/>
-              <a:t>Prefer </a:t>
-            </a:r>
-            <a:r>
-              <a:rPr lang="en-US" sz="2800" dirty="0"/>
-              <a:t>the route with highest WEIGHT [</a:t>
-            </a:r>
-            <a:r>
-              <a:rPr lang="en-US" sz="2800" dirty="0" smtClean="0"/>
-              <a:t>Cisco-specific, </a:t>
-            </a:r>
-            <a:r>
-              <a:rPr lang="en-US" sz="2800" dirty="0"/>
-              <a:t>local to the router].</a:t>
-            </a:r>
-          </a:p>
-          <a:p>
-            <a:pPr lvl="0"/>
-            <a:r>
-              <a:rPr lang="en-US" sz="2800" dirty="0"/>
-              <a:t>Prefer the route with highest </a:t>
-            </a:r>
-            <a:r>
-              <a:rPr lang="en-US" sz="2800" dirty="0" err="1" smtClean="0"/>
-              <a:t>LOCAL_PERF</a:t>
-            </a:r>
-            <a:r>
-              <a:rPr lang="en-US" sz="2800" dirty="0" smtClean="0"/>
-              <a:t> [Local within an AS].</a:t>
-            </a:r>
-          </a:p>
-          <a:p>
-            <a:pPr lvl="0"/>
-            <a:r>
-              <a:rPr lang="en-US" sz="2800" dirty="0" smtClean="0"/>
-              <a:t>Prefer locally originated routes.</a:t>
-            </a:r>
-          </a:p>
-          <a:p>
-            <a:pPr lvl="0"/>
-            <a:r>
-              <a:rPr lang="en-US" sz="2800" dirty="0" smtClean="0"/>
-              <a:t>Prefer </a:t>
-            </a:r>
-            <a:r>
-              <a:rPr lang="en-US" sz="2800" dirty="0"/>
-              <a:t>the route with the shortest </a:t>
-            </a:r>
-            <a:r>
-              <a:rPr lang="en-US" sz="2800" dirty="0" err="1"/>
-              <a:t>AS_PATH</a:t>
-            </a:r>
-            <a:r>
-              <a:rPr lang="en-US" sz="2800" dirty="0"/>
-              <a:t>.</a:t>
-            </a:r>
-          </a:p>
-          <a:p>
-            <a:pPr lvl="0"/>
-            <a:r>
-              <a:rPr lang="en-US" sz="2800" dirty="0"/>
-              <a:t>Prefer the route with lowest origin code (i.e. </a:t>
-            </a:r>
-            <a:r>
-              <a:rPr lang="en-US" sz="2800" dirty="0" smtClean="0"/>
-              <a:t>In order of preference: </a:t>
-            </a:r>
-            <a:r>
-              <a:rPr lang="en-US" sz="2800" dirty="0" err="1" smtClean="0"/>
-              <a:t>IGP</a:t>
-            </a:r>
-            <a:r>
-              <a:rPr lang="en-US" sz="2800" dirty="0" smtClean="0"/>
-              <a:t>, </a:t>
-            </a:r>
-            <a:r>
-              <a:rPr lang="en-US" sz="2800" dirty="0" err="1" smtClean="0"/>
-              <a:t>EGP</a:t>
-            </a:r>
-            <a:r>
-              <a:rPr lang="en-US" sz="2800" dirty="0" smtClean="0"/>
-              <a:t>, incomplete routes).</a:t>
-            </a:r>
-            <a:endParaRPr lang="en-US" sz="2800" dirty="0"/>
-          </a:p>
-          <a:p>
-            <a:pPr lvl="0"/>
-            <a:r>
-              <a:rPr lang="en-US" sz="2800" dirty="0"/>
-              <a:t>Prefer the route with the lowest multi-exit discriminator (MED).</a:t>
-            </a:r>
-          </a:p>
-          <a:p>
-            <a:pPr lvl="0"/>
-            <a:r>
-              <a:rPr lang="en-US" sz="2800" dirty="0"/>
-              <a:t>Prefer </a:t>
-            </a:r>
-            <a:r>
-              <a:rPr lang="en-US" sz="2800" dirty="0" err="1"/>
-              <a:t>EBGP</a:t>
-            </a:r>
-            <a:r>
-              <a:rPr lang="en-US" sz="2800" dirty="0"/>
-              <a:t> learnt routes over </a:t>
-            </a:r>
-            <a:r>
-              <a:rPr lang="en-US" sz="2800" dirty="0" err="1"/>
-              <a:t>IBGP</a:t>
-            </a:r>
-            <a:r>
-              <a:rPr lang="en-US" sz="2800" dirty="0"/>
-              <a:t> learnt routes. If best route is selected, skip </a:t>
-            </a:r>
-            <a:r>
-              <a:rPr lang="en-US" sz="2800" dirty="0" smtClean="0"/>
-              <a:t>next step</a:t>
-            </a:r>
-            <a:endParaRPr lang="en-US" sz="2800" dirty="0"/>
-          </a:p>
-          <a:p>
-            <a:pPr lvl="0"/>
-            <a:r>
-              <a:rPr lang="en-US" sz="2800" dirty="0"/>
-              <a:t>Prefer the route with the smallest </a:t>
-            </a:r>
-            <a:r>
-              <a:rPr lang="en-US" sz="2800" dirty="0" err="1"/>
-              <a:t>IGP</a:t>
-            </a:r>
-            <a:r>
-              <a:rPr lang="en-US" sz="2800" dirty="0"/>
-              <a:t> metric to the BGP next-hop.</a:t>
-            </a:r>
-          </a:p>
-          <a:p>
-            <a:pPr lvl="0"/>
-            <a:r>
-              <a:rPr lang="en-US" sz="2800" dirty="0"/>
-              <a:t>Determine if multiple routes require installation into the routing table for BGP Multipath. If best route is not selected, continue to </a:t>
-            </a:r>
-            <a:r>
-              <a:rPr lang="en-US" sz="2800" dirty="0" smtClean="0"/>
-              <a:t>next step</a:t>
-            </a:r>
-            <a:endParaRPr lang="en-US" sz="2800" dirty="0"/>
-          </a:p>
-          <a:p>
-            <a:pPr lvl="0"/>
-            <a:r>
-              <a:rPr lang="en-US" sz="2800" dirty="0"/>
-              <a:t>When both routes are external, prefer the oldest route (received first)</a:t>
-            </a:r>
-          </a:p>
-          <a:p>
-            <a:pPr lvl="0"/>
-            <a:r>
-              <a:rPr lang="en-US" sz="2800" dirty="0" smtClean="0"/>
-              <a:t>Prefer the route from the BGP router with the lowest router ID.</a:t>
-            </a:r>
-          </a:p>
-          <a:p>
-            <a:pPr lvl="0"/>
-            <a:r>
-              <a:rPr lang="en-US" sz="2800" dirty="0" smtClean="0"/>
-              <a:t>When both router IDs are the same for multiple routes, prefer the route with the smallest cluster list.</a:t>
-            </a:r>
-          </a:p>
-          <a:p>
-            <a:pPr lvl="0"/>
-            <a:r>
-              <a:rPr lang="en-US" sz="2800" dirty="0" smtClean="0"/>
-              <a:t>Prefer the route with the lowest neighbor address.</a:t>
-            </a:r>
-            <a:endParaRPr lang="en-US" sz="2200" dirty="0">
-              <a:solidFill>
-                <a:srgbClr val="FF0000"/>
-              </a:solidFill>
-            </a:endParaRPr>
+            <a:pPr lvl="1"/>
+            <a:r>
+              <a:rPr lang="en-US" dirty="0" smtClean="0"/>
+              <a:t>Version Negotiation</a:t>
+            </a:r>
+          </a:p>
+          <a:p>
+            <a:pPr lvl="2"/>
+            <a:r>
+              <a:rPr lang="en-US" dirty="0" smtClean="0"/>
+              <a:t>Negotiated by making multiple attempts at opening a BGP connection, starting with the highest number the BGP speaker supports</a:t>
+            </a:r>
+          </a:p>
+          <a:p>
+            <a:pPr lvl="2"/>
+            <a:r>
+              <a:rPr lang="en-US" dirty="0" smtClean="0"/>
+              <a:t>Highest common version between BGP speakers is used</a:t>
+            </a:r>
+            <a:endParaRPr lang="en-US" dirty="0"/>
+          </a:p>
+          <a:p>
+            <a:pPr lvl="1"/>
+            <a:r>
+              <a:rPr lang="en-US" dirty="0" smtClean="0"/>
+              <a:t>Timers</a:t>
+            </a:r>
+          </a:p>
+          <a:p>
+            <a:pPr lvl="2"/>
+            <a:r>
+              <a:rPr lang="en-US" dirty="0" smtClean="0"/>
+              <a:t>BGP employs five main timers and two optional timers:</a:t>
+            </a:r>
+          </a:p>
+          <a:p>
+            <a:pPr lvl="3"/>
+            <a:r>
+              <a:rPr lang="en-US" dirty="0" smtClean="0"/>
+              <a:t>ConnectRetryTimer (default 120 seconds)</a:t>
+            </a:r>
+          </a:p>
+          <a:p>
+            <a:pPr lvl="3"/>
+            <a:r>
+              <a:rPr lang="en-US" dirty="0" smtClean="0"/>
+              <a:t>HoldTimer (default 90 seconds)</a:t>
+            </a:r>
+          </a:p>
+          <a:p>
+            <a:pPr lvl="3"/>
+            <a:r>
+              <a:rPr lang="en-US" dirty="0" smtClean="0"/>
+              <a:t>KeepaliveTimer (default 1/3 HoldTimer)</a:t>
+            </a:r>
+          </a:p>
+          <a:p>
+            <a:pPr lvl="3"/>
+            <a:r>
+              <a:rPr lang="en-US" dirty="0" smtClean="0"/>
+              <a:t>MinASOriginationIntervalTimer (default 15 seconds)</a:t>
+            </a:r>
+          </a:p>
+          <a:p>
+            <a:pPr lvl="3"/>
+            <a:r>
+              <a:rPr lang="en-US" dirty="0" smtClean="0"/>
+              <a:t>MinRouteAdvertisementIntervalTimer (default 30 seconds for EBGP; 5 seconds for IBGP)</a:t>
+            </a:r>
+            <a:endParaRPr lang="en-US" dirty="0"/>
+          </a:p>
+          <a:p>
+            <a:pPr lvl="3"/>
+            <a:r>
+              <a:rPr lang="en-US" dirty="0" smtClean="0"/>
+              <a:t>Optional: DelayOpenTimer</a:t>
+            </a:r>
+          </a:p>
+          <a:p>
+            <a:pPr lvl="3"/>
+            <a:r>
+              <a:rPr lang="en-US" dirty="0" smtClean="0"/>
+              <a:t>Optional: IdleHoldTimer</a:t>
+            </a:r>
+            <a:endParaRPr lang="en-US" dirty="0"/>
+          </a:p>
+          <a:p>
+            <a:pPr lvl="1"/>
+            <a:r>
+              <a:rPr lang="en-US" dirty="0" smtClean="0"/>
+              <a:t>Security</a:t>
+            </a:r>
+          </a:p>
+          <a:p>
+            <a:pPr lvl="2"/>
+            <a:r>
+              <a:rPr lang="en-US" dirty="0" smtClean="0"/>
+              <a:t>Uses TCP for reliability of traffic transport between BGP speakers with added mechanisms defined in </a:t>
+            </a:r>
+            <a:r>
+              <a:rPr lang="en-US" dirty="0"/>
+              <a:t>RFC </a:t>
+            </a:r>
+            <a:r>
+              <a:rPr lang="en-US" dirty="0" smtClean="0"/>
+              <a:t>2385 to:</a:t>
+            </a:r>
+          </a:p>
+          <a:p>
+            <a:pPr lvl="3"/>
+            <a:r>
+              <a:rPr lang="en-US" dirty="0" smtClean="0"/>
+              <a:t>Detect and reject wiretapping attacks</a:t>
+            </a:r>
+          </a:p>
+          <a:p>
+            <a:pPr lvl="3"/>
+            <a:r>
+              <a:rPr lang="en-US" dirty="0" smtClean="0"/>
+              <a:t>Augments the normal TCP checksum with a 16-byte message authentication code (MAC) based on MD5</a:t>
+            </a:r>
+          </a:p>
+          <a:p>
+            <a:pPr lvl="2"/>
+            <a:endParaRPr lang="en-US" dirty="0"/>
           </a:p>
         </p:txBody>
       </p:sp>
@@ -4975,29 +4917,39 @@
             <p:ph type="title"/>
           </p:nvPr>
         </p:nvSpPr>
-        <p:spPr/>
+        <p:spPr>
+          <a:xfrm>
+            <a:off x="237507" y="274638"/>
+            <a:ext cx="8680862" cy="1143000"/>
+          </a:xfrm>
+        </p:spPr>
         <p:txBody>
           <a:bodyPr>
-            <a:normAutofit/>
+            <a:normAutofit fontScale="90000"/>
           </a:bodyPr>
           <a:lstStyle/>
           <a:p>
+            <a:pPr lvl="0"/>
             <a:r>
               <a:rPr lang="en-US" dirty="0" smtClean="0">
                 <a:solidFill>
                   <a:srgbClr val="000090"/>
                 </a:solidFill>
               </a:rPr>
-              <a:t>Best Path Selection Algorithm</a:t>
-            </a:r>
-            <a:endParaRPr lang="en-US" dirty="0"/>
+              <a:t>Implementation of Standard (cont.)</a:t>
+            </a:r>
+            <a:endParaRPr lang="en-US" dirty="0">
+              <a:solidFill>
+                <a:srgbClr val="000090"/>
+              </a:solidFill>
+            </a:endParaRPr>
           </a:p>
         </p:txBody>
       </p:sp>
     </p:spTree>
     <p:extLst>
       <p:ext uri="{BB962C8B-B14F-4D97-AF65-F5344CB8AC3E}">
-        <p14:creationId xmlns:p14="http://schemas.microsoft.com/office/powerpoint/2010/main" val="1817177015"/>
+        <p14:creationId xmlns:p14="http://schemas.microsoft.com/office/powerpoint/2010/main" val="3549249704"/>
       </p:ext>
     </p:extLst>
   </p:cSld>
@@ -5043,175 +4995,145 @@
         </p:nvSpPr>
         <p:spPr>
           <a:xfrm>
-            <a:off x="457200" y="1417320"/>
-            <a:ext cx="8229600" cy="4924103"/>
+            <a:off x="370932" y="1481328"/>
+            <a:ext cx="8531524" cy="4815955"/>
           </a:xfrm>
         </p:spPr>
         <p:txBody>
           <a:bodyPr>
-            <a:normAutofit fontScale="70000" lnSpcReduction="20000"/>
+            <a:normAutofit fontScale="85000" lnSpcReduction="20000"/>
           </a:bodyPr>
           <a:lstStyle/>
           <a:p>
+            <a:r>
+              <a:rPr lang="en-US" dirty="0" smtClean="0"/>
+              <a:t>Routers usually used in small offices and/or home networks may not be capable of running BGP.</a:t>
+            </a:r>
+          </a:p>
+          <a:p>
+            <a:r>
+              <a:rPr lang="en-US" dirty="0" smtClean="0"/>
+              <a:t>Commercial grade routers found in large enterprise networks and Internet Service Providers (ISPs) typicall</a:t>
+            </a:r>
+            <a:r>
+              <a:rPr lang="en-US" dirty="0" smtClean="0"/>
+              <a:t>y have operating systems that are capable of supporting BGP.</a:t>
+            </a:r>
+          </a:p>
+          <a:p>
             <a:pPr lvl="1"/>
             <a:r>
               <a:rPr lang="en-US" dirty="0" smtClean="0"/>
-              <a:t>Message Format</a:t>
-            </a:r>
-          </a:p>
-          <a:p>
-            <a:pPr lvl="2"/>
+              <a:t>Common manufacturers include Cisco, Alcatel Lucent, and Juniper Networks.</a:t>
+            </a:r>
+            <a:endParaRPr lang="en-US" dirty="0"/>
+          </a:p>
+          <a:p>
+            <a:r>
+              <a:rPr lang="en-US" dirty="0"/>
+              <a:t>The actual amount of memory required </a:t>
+            </a:r>
             <a:r>
               <a:rPr lang="en-US" dirty="0" smtClean="0"/>
-              <a:t>Max size 4096 bytes; Smallest size 19 bytes (header and no data)</a:t>
-            </a:r>
-          </a:p>
-          <a:p>
-            <a:pPr lvl="2"/>
+              <a:t>for </a:t>
+            </a:r>
+            <a:r>
+              <a:rPr lang="en-US" dirty="0"/>
+              <a:t>a BGP </a:t>
+            </a:r>
             <a:r>
               <a:rPr lang="en-US" dirty="0" smtClean="0"/>
-              <a:t>All fields are multi-byte fields are big-endian</a:t>
-            </a:r>
-          </a:p>
-          <a:p>
-            <a:pPr lvl="2"/>
+              <a:t>speaker </a:t>
+            </a:r>
+            <a:r>
+              <a:rPr lang="en-US" dirty="0"/>
+              <a:t>depends on the </a:t>
+            </a:r>
             <a:r>
               <a:rPr lang="en-US" dirty="0" smtClean="0"/>
-              <a:t>4 types of BGP messages: Open, Update, Notification, and Keep Alive.</a:t>
-            </a:r>
-            <a:endParaRPr lang="en-US" dirty="0"/>
-          </a:p>
-          <a:p>
-            <a:pPr lvl="1"/>
+              <a:t>volume </a:t>
+            </a:r>
             <a:r>
               <a:rPr lang="en-US" dirty="0"/>
-              <a:t>Routing </a:t>
+              <a:t>of BGP information </a:t>
             </a:r>
             <a:r>
               <a:rPr lang="en-US" dirty="0" smtClean="0"/>
-              <a:t>Updates</a:t>
-            </a:r>
-          </a:p>
-          <a:p>
-            <a:pPr lvl="2"/>
+              <a:t>exchanged </a:t>
+            </a:r>
+            <a:r>
+              <a:rPr lang="en-US" dirty="0"/>
+              <a:t>with </a:t>
+            </a:r>
             <a:r>
               <a:rPr lang="en-US" dirty="0" smtClean="0"/>
-              <a:t>Entire routing table is sent when a peer/speaker boots</a:t>
-            </a:r>
-          </a:p>
-          <a:p>
-            <a:pPr lvl="2"/>
+              <a:t>the other </a:t>
+            </a:r>
+            <a:r>
+              <a:rPr lang="en-US" dirty="0"/>
+              <a:t>BGP </a:t>
+            </a:r>
             <a:r>
               <a:rPr lang="en-US" dirty="0" smtClean="0"/>
-              <a:t>After boot only updates are sent</a:t>
-            </a:r>
-          </a:p>
-          <a:p>
-            <a:pPr lvl="2"/>
+              <a:t>speakers as well as the way the </a:t>
+            </a:r>
+            <a:r>
+              <a:rPr lang="en-US" dirty="0"/>
+              <a:t>particular </a:t>
+            </a:r>
             <a:r>
               <a:rPr lang="en-US" dirty="0" smtClean="0"/>
-              <a:t>Route updates are stored in the Routing Information Base (RIB)</a:t>
-            </a:r>
-            <a:endParaRPr lang="en-US" dirty="0"/>
-          </a:p>
-          <a:p>
-            <a:pPr lvl="1"/>
+              <a:t>BGP speaker </a:t>
+            </a:r>
             <a:r>
               <a:rPr lang="en-US" dirty="0"/>
-              <a:t>Path </a:t>
+              <a:t>stores BGP </a:t>
             </a:r>
             <a:r>
               <a:rPr lang="en-US" dirty="0" smtClean="0"/>
-              <a:t>Attributes</a:t>
-            </a:r>
-          </a:p>
-          <a:p>
-            <a:pPr lvl="2"/>
+              <a:t>information.</a:t>
+            </a:r>
+          </a:p>
+          <a:p>
             <a:r>
               <a:rPr lang="en-US" dirty="0" smtClean="0"/>
-              <a:t>AS_PATH – path that traverses the least number of AS.</a:t>
-            </a:r>
-          </a:p>
-          <a:p>
-            <a:pPr lvl="2"/>
+              <a:t>Open source </a:t>
+            </a:r>
+            <a:r>
+              <a:rPr lang="en-US" dirty="0"/>
+              <a:t>packages </a:t>
+            </a:r>
             <a:r>
               <a:rPr lang="en-US" dirty="0" smtClean="0"/>
-              <a:t>MED – allows an exit point to be specified to a remote AS for a multi exit point network.</a:t>
-            </a:r>
-          </a:p>
-          <a:p>
-            <a:pPr lvl="2"/>
-            <a:r>
-              <a:rPr lang="en-US" dirty="0" smtClean="0"/>
-              <a:t>Origin – specifies the origin of a routing update; can be used in determining the preferred route</a:t>
-            </a:r>
-          </a:p>
-          <a:p>
-            <a:pPr lvl="1"/>
+              <a:t>capable of running BGP </a:t>
+            </a:r>
             <a:r>
               <a:rPr lang="en-US" dirty="0"/>
-              <a:t>Error Handling</a:t>
-            </a:r>
-          </a:p>
-          <a:p>
-            <a:pPr lvl="2"/>
+              <a:t>include GNU Zebra, </a:t>
+            </a:r>
             <a:r>
               <a:rPr lang="en-US" dirty="0"/>
-              <a:t>When an error occurs, a notification message with the following is sent:</a:t>
-            </a:r>
-          </a:p>
-          <a:p>
-            <a:pPr lvl="3"/>
+              <a:t>Ouagga</a:t>
+            </a:r>
             <a:r>
               <a:rPr lang="en-US" dirty="0"/>
-              <a:t>Error Code</a:t>
-            </a:r>
-          </a:p>
-          <a:p>
-            <a:pPr lvl="3"/>
+              <a:t>, Open BGPD, BIRD, XORP, and </a:t>
+            </a:r>
             <a:r>
               <a:rPr lang="en-US" dirty="0"/>
-              <a:t>Error </a:t>
-            </a:r>
-            <a:r>
-              <a:rPr lang="en-US" dirty="0" err="1"/>
-              <a:t>Subcode</a:t>
+              <a:t>Vyatta</a:t>
             </a:r>
             <a:r>
               <a:rPr lang="en-US" dirty="0"/>
-              <a:t> (0 if none specified)</a:t>
-            </a:r>
-          </a:p>
-          <a:p>
-            <a:pPr lvl="3"/>
-            <a:r>
-              <a:rPr lang="en-US" dirty="0" smtClean="0"/>
-              <a:t>Data fields</a:t>
-            </a:r>
-          </a:p>
-          <a:p>
-            <a:pPr lvl="2"/>
-            <a:r>
-              <a:rPr lang="en-US" dirty="0" smtClean="0"/>
-              <a:t>Routing </a:t>
-            </a:r>
-            <a:r>
-              <a:rPr lang="en-US" dirty="0"/>
-              <a:t>table entries </a:t>
-            </a:r>
-            <a:r>
-              <a:rPr lang="en-US" dirty="0" smtClean="0"/>
-              <a:t>errors associated </a:t>
-            </a:r>
-            <a:r>
-              <a:rPr lang="en-US" dirty="0"/>
-              <a:t>with remote BGP speakers are marked as </a:t>
-            </a:r>
-            <a:r>
-              <a:rPr lang="en-US" dirty="0" smtClean="0"/>
-              <a:t>invalid</a:t>
-            </a:r>
-            <a:endParaRPr lang="en-US" dirty="0"/>
+              <a:t>.</a:t>
+            </a:r>
+          </a:p>
+          <a:p>
+            <a:endParaRPr lang="en-US" dirty="0">
+              <a:solidFill>
+                <a:srgbClr val="FF0000"/>
+              </a:solidFill>
+            </a:endParaRPr>
           </a:p>
         </p:txBody>
       </p:sp>
@@ -5228,7 +5150,7 @@
         <p:spPr/>
         <p:txBody>
           <a:bodyPr>
-            <a:normAutofit/>
+            <a:normAutofit fontScale="90000"/>
           </a:bodyPr>
           <a:lstStyle/>
           <a:p>
@@ -5239,7 +5161,7 @@
                   <a:srgbClr val="000090"/>
                 </a:solidFill>
               </a:rPr>
-              <a:t>Implementation of Standard</a:t>
+              <a:t>Hardware and Software Requirements for BGP</a:t>
             </a:r>
             <a:endParaRPr lang="en-US" dirty="0">
               <a:solidFill>
@@ -5252,7 +5174,7 @@
     </p:spTree>
     <p:extLst>
       <p:ext uri="{BB962C8B-B14F-4D97-AF65-F5344CB8AC3E}">
-        <p14:creationId xmlns:p14="http://schemas.microsoft.com/office/powerpoint/2010/main" val="1231550707"/>
+        <p14:creationId xmlns:p14="http://schemas.microsoft.com/office/powerpoint/2010/main" val="1395470095"/>
       </p:ext>
     </p:extLst>
   </p:cSld>
@@ -5298,8 +5220,8 @@
         </p:nvSpPr>
         <p:spPr>
           <a:xfrm>
-            <a:off x="237507" y="1481327"/>
-            <a:ext cx="8680862" cy="4719447"/>
+            <a:off x="457200" y="1328928"/>
+            <a:ext cx="8229600" cy="4881372"/>
           </a:xfrm>
         </p:spPr>
         <p:txBody>
@@ -5308,388 +5230,6 @@
           </a:bodyPr>
           <a:lstStyle/>
           <a:p>
-            <a:pPr lvl="1"/>
-            <a:r>
-              <a:rPr lang="en-US" dirty="0" smtClean="0"/>
-              <a:t>Version Negotiation</a:t>
-            </a:r>
-          </a:p>
-          <a:p>
-            <a:pPr lvl="2"/>
-            <a:r>
-              <a:rPr lang="en-US" dirty="0" smtClean="0"/>
-              <a:t>Negotiated by making multiple attempts at opening a BGP connection, starting with the highest number the BGP speaker supports</a:t>
-            </a:r>
-          </a:p>
-          <a:p>
-            <a:pPr lvl="2"/>
-            <a:r>
-              <a:rPr lang="en-US" dirty="0" smtClean="0"/>
-              <a:t>Highest common version between BGP speakers is used</a:t>
-            </a:r>
-            <a:endParaRPr lang="en-US" dirty="0"/>
-          </a:p>
-          <a:p>
-            <a:pPr lvl="1"/>
-            <a:r>
-              <a:rPr lang="en-US" dirty="0" smtClean="0"/>
-              <a:t>Timers</a:t>
-            </a:r>
-          </a:p>
-          <a:p>
-            <a:pPr lvl="2"/>
-            <a:r>
-              <a:rPr lang="en-US" dirty="0" smtClean="0"/>
-              <a:t>BGP employs five main timers and two optional timers:</a:t>
-            </a:r>
-          </a:p>
-          <a:p>
-            <a:pPr lvl="3"/>
-            <a:r>
-              <a:rPr lang="en-US" dirty="0" err="1" smtClean="0"/>
-              <a:t>ConnectRetryTimer</a:t>
-            </a:r>
-            <a:r>
-              <a:rPr lang="en-US" dirty="0" smtClean="0"/>
-              <a:t> (default 120 seconds)</a:t>
-            </a:r>
-          </a:p>
-          <a:p>
-            <a:pPr lvl="3"/>
-            <a:r>
-              <a:rPr lang="en-US" dirty="0" err="1" smtClean="0"/>
-              <a:t>HoldTimer</a:t>
-            </a:r>
-            <a:r>
-              <a:rPr lang="en-US" dirty="0" smtClean="0"/>
-              <a:t> (default 90 seconds)</a:t>
-            </a:r>
-          </a:p>
-          <a:p>
-            <a:pPr lvl="3"/>
-            <a:r>
-              <a:rPr lang="en-US" dirty="0" err="1" smtClean="0"/>
-              <a:t>KeepaliveTimer</a:t>
-            </a:r>
-            <a:r>
-              <a:rPr lang="en-US" dirty="0" smtClean="0"/>
-              <a:t> (default 1/3 </a:t>
-            </a:r>
-            <a:r>
-              <a:rPr lang="en-US" dirty="0" err="1" smtClean="0"/>
-              <a:t>HoldTimer</a:t>
-            </a:r>
-            <a:r>
-              <a:rPr lang="en-US" dirty="0" smtClean="0"/>
-              <a:t>)</a:t>
-            </a:r>
-          </a:p>
-          <a:p>
-            <a:pPr lvl="3"/>
-            <a:r>
-              <a:rPr lang="en-US" dirty="0" err="1" smtClean="0"/>
-              <a:t>MinASOriginationIntervalTimer</a:t>
-            </a:r>
-            <a:r>
-              <a:rPr lang="en-US" dirty="0" smtClean="0"/>
-              <a:t> (default 15 seconds)</a:t>
-            </a:r>
-          </a:p>
-          <a:p>
-            <a:pPr lvl="3"/>
-            <a:r>
-              <a:rPr lang="en-US" dirty="0" err="1" smtClean="0"/>
-              <a:t>MinRouteAdvertisementIntervalTimer</a:t>
-            </a:r>
-            <a:r>
-              <a:rPr lang="en-US" dirty="0" smtClean="0"/>
-              <a:t> (default 30 seconds for EBGP; 5 seconds for IBGP)</a:t>
-            </a:r>
-            <a:endParaRPr lang="en-US" dirty="0"/>
-          </a:p>
-          <a:p>
-            <a:pPr lvl="3"/>
-            <a:r>
-              <a:rPr lang="en-US" dirty="0" smtClean="0"/>
-              <a:t>Optional: </a:t>
-            </a:r>
-            <a:r>
-              <a:rPr lang="en-US" dirty="0" err="1" smtClean="0"/>
-              <a:t>DelayOpenTimer</a:t>
-            </a:r>
-            <a:endParaRPr lang="en-US" dirty="0" smtClean="0"/>
-          </a:p>
-          <a:p>
-            <a:pPr lvl="3"/>
-            <a:r>
-              <a:rPr lang="en-US" dirty="0" smtClean="0"/>
-              <a:t>Optional: </a:t>
-            </a:r>
-            <a:r>
-              <a:rPr lang="en-US" dirty="0" err="1" smtClean="0"/>
-              <a:t>IdleHoldTimer</a:t>
-            </a:r>
-            <a:endParaRPr lang="en-US" dirty="0"/>
-          </a:p>
-          <a:p>
-            <a:pPr lvl="1"/>
-            <a:r>
-              <a:rPr lang="en-US" dirty="0" smtClean="0"/>
-              <a:t>Security</a:t>
-            </a:r>
-          </a:p>
-          <a:p>
-            <a:pPr lvl="2"/>
-            <a:r>
-              <a:rPr lang="en-US" dirty="0" smtClean="0"/>
-              <a:t>Uses TCP for reliability of traffic transport between BGP speakers with added mechanisms defined in </a:t>
-            </a:r>
-            <a:r>
-              <a:rPr lang="en-US" dirty="0"/>
-              <a:t>RFC </a:t>
-            </a:r>
-            <a:r>
-              <a:rPr lang="en-US" dirty="0" smtClean="0"/>
-              <a:t>2385 to:</a:t>
-            </a:r>
-          </a:p>
-          <a:p>
-            <a:pPr lvl="3"/>
-            <a:r>
-              <a:rPr lang="en-US" dirty="0" smtClean="0"/>
-              <a:t>Detect and reject wiretapping attacks</a:t>
-            </a:r>
-          </a:p>
-          <a:p>
-            <a:pPr lvl="3"/>
-            <a:r>
-              <a:rPr lang="en-US" dirty="0" smtClean="0"/>
-              <a:t>Augments the normal TCP checksum with a 16-byte message authentication code (MAC) based on MD5</a:t>
-            </a:r>
-          </a:p>
-          <a:p>
-            <a:pPr lvl="2"/>
-            <a:endParaRPr lang="en-US" dirty="0"/>
-          </a:p>
-        </p:txBody>
-      </p:sp>
-      <p:sp>
-        <p:nvSpPr>
-          <p:cNvPr id="2" name="Title 1"/>
-          <p:cNvSpPr>
-            <a:spLocks noGrp="1"/>
-          </p:cNvSpPr>
-          <p:nvPr>
-            <p:ph type="title"/>
-          </p:nvPr>
-        </p:nvSpPr>
-        <p:spPr>
-          <a:xfrm>
-            <a:off x="237507" y="274638"/>
-            <a:ext cx="8680862" cy="1143000"/>
-          </a:xfrm>
-        </p:spPr>
-        <p:txBody>
-          <a:bodyPr>
-            <a:normAutofit fontScale="90000"/>
-          </a:bodyPr>
-          <a:lstStyle/>
-          <a:p>
-            <a:pPr lvl="0"/>
-            <a:r>
-              <a:rPr lang="en-US" dirty="0" smtClean="0">
-                <a:solidFill>
-                  <a:srgbClr val="000090"/>
-                </a:solidFill>
-              </a:rPr>
-              <a:t>Implementation of Standard (cont.)</a:t>
-            </a:r>
-            <a:endParaRPr lang="en-US" dirty="0">
-              <a:solidFill>
-                <a:srgbClr val="000090"/>
-              </a:solidFill>
-            </a:endParaRPr>
-          </a:p>
-        </p:txBody>
-      </p:sp>
-    </p:spTree>
-    <p:extLst>
-      <p:ext uri="{BB962C8B-B14F-4D97-AF65-F5344CB8AC3E}">
-        <p14:creationId xmlns:p14="http://schemas.microsoft.com/office/powerpoint/2010/main" val="3549249704"/>
-      </p:ext>
-    </p:extLst>
-  </p:cSld>
-  <p:clrMapOvr>
-    <a:masterClrMapping/>
-  </p:clrMapOvr>
-  <p:timing>
-    <p:tnLst>
-      <p:par>
-        <p:cTn id="1" dur="indefinite" restart="never" nodeType="tmRoot"/>
-      </p:par>
-    </p:tnLst>
-  </p:timing>
-</p:sld>
-</file>
-
-<file path=ppt/slides/slide13.xml><?xml version="1.0" encoding="utf-8"?>
-<p:sld xmlns:a="http://schemas.openxmlformats.org/drawingml/2006/main" xmlns:r="http://schemas.openxmlformats.org/officeDocument/2006/relationships" xmlns:p="http://schemas.openxmlformats.org/presentationml/2006/main">
-  <p:cSld>
-    <p:spTree>
-      <p:nvGrpSpPr>
-        <p:cNvPr id="1" name=""/>
-        <p:cNvGrpSpPr/>
-        <p:nvPr/>
-      </p:nvGrpSpPr>
-      <p:grpSpPr>
-        <a:xfrm>
-          <a:off x="0" y="0"/>
-          <a:ext cx="0" cy="0"/>
-          <a:chOff x="0" y="0"/>
-          <a:chExt cx="0" cy="0"/>
-        </a:xfrm>
-      </p:grpSpPr>
-      <p:sp>
-        <p:nvSpPr>
-          <p:cNvPr id="3" name="Vertical Text Placeholder 2"/>
-          <p:cNvSpPr>
-            <a:spLocks noGrp="1"/>
-          </p:cNvSpPr>
-          <p:nvPr>
-            <p:ph idx="1"/>
-          </p:nvPr>
-        </p:nvSpPr>
-        <p:spPr/>
-        <p:txBody>
-          <a:bodyPr>
-            <a:normAutofit/>
-          </a:bodyPr>
-          <a:lstStyle/>
-          <a:p>
-            <a:r>
-              <a:rPr lang="en-US" dirty="0">
-                <a:solidFill>
-                  <a:srgbClr val="FF0000"/>
-                </a:solidFill>
-              </a:rPr>
-              <a:t>BGP is a layer 4 protocol which comes before TCP.</a:t>
-            </a:r>
-          </a:p>
-          <a:p>
-            <a:r>
-              <a:rPr lang="en-US" dirty="0">
-                <a:solidFill>
-                  <a:srgbClr val="FF0000"/>
-                </a:solidFill>
-              </a:rPr>
-              <a:t>It supports Classless Inter-Domain Routing and use of route aggregation to decrease the size of routings. Routers which are usually installed for small office are not capable for running BGP. </a:t>
-            </a:r>
-          </a:p>
-          <a:p>
-            <a:r>
-              <a:rPr lang="en-US" dirty="0">
-                <a:solidFill>
-                  <a:srgbClr val="FF0000"/>
-                </a:solidFill>
-              </a:rPr>
-              <a:t>In big organizations, which have big commercial routers also need some specific executable image that contained BGP. </a:t>
-            </a:r>
-          </a:p>
-        </p:txBody>
-      </p:sp>
-      <p:sp>
-        <p:nvSpPr>
-          <p:cNvPr id="2" name="Title 1"/>
-          <p:cNvSpPr>
-            <a:spLocks noGrp="1"/>
-          </p:cNvSpPr>
-          <p:nvPr>
-            <p:ph type="title"/>
-          </p:nvPr>
-        </p:nvSpPr>
-        <p:spPr/>
-        <p:txBody>
-          <a:bodyPr>
-            <a:normAutofit fontScale="90000"/>
-          </a:bodyPr>
-          <a:lstStyle/>
-          <a:p>
-            <a:pPr lvl="0"/>
-            <a:r>
-              <a:rPr lang="en-US" dirty="0" smtClean="0">
-                <a:solidFill>
-                  <a:srgbClr val="000090"/>
-                </a:solidFill>
-              </a:rPr>
-              <a:t>Hardware and Software Requirements for BGP</a:t>
-            </a:r>
-            <a:endParaRPr lang="en-US" dirty="0">
-              <a:solidFill>
-                <a:srgbClr val="000090"/>
-              </a:solidFill>
-            </a:endParaRPr>
-          </a:p>
-        </p:txBody>
-      </p:sp>
-    </p:spTree>
-    <p:extLst>
-      <p:ext uri="{BB962C8B-B14F-4D97-AF65-F5344CB8AC3E}">
-        <p14:creationId xmlns:p14="http://schemas.microsoft.com/office/powerpoint/2010/main" val="1395470095"/>
-      </p:ext>
-    </p:extLst>
-  </p:cSld>
-  <p:clrMapOvr>
-    <a:masterClrMapping/>
-  </p:clrMapOvr>
-  <p:timing>
-    <p:tnLst>
-      <p:par>
-        <p:cTn id="1" dur="indefinite" restart="never" nodeType="tmRoot"/>
-      </p:par>
-    </p:tnLst>
-  </p:timing>
-</p:sld>
-</file>
-
-<file path=ppt/slides/slide14.xml><?xml version="1.0" encoding="utf-8"?>
-<p:sld xmlns:a="http://schemas.openxmlformats.org/drawingml/2006/main" xmlns:r="http://schemas.openxmlformats.org/officeDocument/2006/relationships" xmlns:p="http://schemas.openxmlformats.org/presentationml/2006/main">
-  <p:cSld>
-    <p:spTree>
-      <p:nvGrpSpPr>
-        <p:cNvPr id="1" name=""/>
-        <p:cNvGrpSpPr/>
-        <p:nvPr/>
-      </p:nvGrpSpPr>
-      <p:grpSpPr>
-        <a:xfrm>
-          <a:off x="0" y="0"/>
-          <a:ext cx="0" cy="0"/>
-          <a:chOff x="0" y="0"/>
-          <a:chExt cx="0" cy="0"/>
-        </a:xfrm>
-      </p:grpSpPr>
-      <p:sp>
-        <p:nvSpPr>
-          <p:cNvPr id="3" name="Vertical Text Placeholder 2"/>
-          <p:cNvSpPr>
-            <a:spLocks noGrp="1"/>
-          </p:cNvSpPr>
-          <p:nvPr>
-            <p:ph idx="1"/>
-          </p:nvPr>
-        </p:nvSpPr>
-        <p:spPr>
-          <a:xfrm>
-            <a:off x="457200" y="1328928"/>
-            <a:ext cx="8229600" cy="4881372"/>
-          </a:xfrm>
-        </p:spPr>
-        <p:txBody>
-          <a:bodyPr>
-            <a:normAutofit fontScale="77500" lnSpcReduction="20000"/>
-          </a:bodyPr>
-          <a:lstStyle/>
-          <a:p>
             <a:pPr lvl="0" fontAlgn="base"/>
             <a:r>
               <a:rPr lang="en-US" sz="2800" dirty="0"/>
@@ -5814,12 +5354,8 @@
               <a:t>(</a:t>
             </a:r>
             <a:r>
-              <a:rPr lang="en-US" sz="2800" dirty="0" err="1" smtClean="0"/>
-              <a:t>DoS</a:t>
-            </a:r>
-            <a:r>
               <a:rPr lang="en-US" sz="2800" dirty="0" smtClean="0"/>
-              <a:t>)</a:t>
+              <a:t>DoS)</a:t>
             </a:r>
           </a:p>
           <a:p>
@@ -5834,15 +5370,7 @@
             </a:r>
             <a:r>
               <a:rPr lang="en-US" sz="2400" dirty="0"/>
-              <a:t>most critical </a:t>
-            </a:r>
-            <a:r>
-              <a:rPr lang="en-US" sz="2400" dirty="0" err="1"/>
-              <a:t>DoS</a:t>
-            </a:r>
-            <a:r>
-              <a:rPr lang="en-US" sz="2400" dirty="0"/>
-              <a:t> attack would be one on the BGP routing protocol itself.</a:t>
+              <a:t>most critical DoS attack would be one on the BGP routing protocol itself.</a:t>
             </a:r>
           </a:p>
         </p:txBody>
@@ -5933,12 +5461,8 @@
           <a:lstStyle/>
           <a:p>
             <a:r>
-              <a:rPr lang="en-US" sz="2400" dirty="0" err="1" smtClean="0"/>
-              <a:t>Ibtihaj</a:t>
-            </a:r>
-            <a:r>
               <a:rPr lang="en-US" sz="2400" dirty="0" smtClean="0"/>
-              <a:t> Alanazi</a:t>
+              <a:t>Ibtihaj Alanazi</a:t>
             </a:r>
           </a:p>
           <a:p>
@@ -5949,27 +5473,18 @@
           </a:p>
           <a:p>
             <a:r>
-              <a:rPr lang="en-US" sz="2400" dirty="0" err="1" smtClean="0"/>
-              <a:t>Amirshahram</a:t>
-            </a:r>
-            <a:r>
               <a:rPr lang="en-US" sz="2400" dirty="0" smtClean="0"/>
-              <a:t> </a:t>
-            </a:r>
-            <a:r>
-              <a:rPr lang="en-US" sz="2400" dirty="0" err="1"/>
+              <a:t>Amirshahram </a:t>
+            </a:r>
+            <a:r>
+              <a:rPr lang="en-US" sz="2400" dirty="0"/>
               <a:t>Hematian</a:t>
             </a:r>
-            <a:endParaRPr lang="en-US" sz="2400" dirty="0"/>
           </a:p>
           <a:p>
             <a:r>
               <a:rPr lang="en-US" sz="2400" dirty="0" smtClean="0"/>
-              <a:t>Kevin </a:t>
-            </a:r>
-            <a:r>
-              <a:rPr lang="en-US" sz="2400" dirty="0" err="1" smtClean="0"/>
-              <a:t>Kuo</a:t>
+              <a:t>Kevin Kuo</a:t>
             </a:r>
             <a:endParaRPr lang="en-US" sz="2400" dirty="0"/>
           </a:p>
@@ -6033,7 +5548,7 @@
               <a:t>Alexander L. </a:t>
             </a:r>
             <a:r>
-              <a:rPr lang="en-US" sz="4000" dirty="0" err="1" smtClean="0"/>
+              <a:rPr lang="en-US" sz="4000" dirty="0" smtClean="0"/>
               <a:t>Wijesinha</a:t>
             </a:r>
             <a:endParaRPr lang="en-US" sz="4000" dirty="0"/>
@@ -6266,182 +5781,154 @@
             <p:ph idx="1"/>
           </p:nvPr>
         </p:nvSpPr>
-        <p:spPr/>
-        <p:txBody>
-          <a:bodyPr/>
+        <p:spPr>
+          <a:xfrm>
+            <a:off x="296883" y="1481328"/>
+            <a:ext cx="8633361" cy="4622589"/>
+          </a:xfrm>
+        </p:spPr>
+        <p:txBody>
+          <a:bodyPr>
+            <a:normAutofit fontScale="92500" lnSpcReduction="20000"/>
+          </a:bodyPr>
           <a:lstStyle/>
           <a:p>
             <a:r>
               <a:rPr lang="en-US" dirty="0">
-                <a:solidFill>
-                  <a:srgbClr val="FF0000"/>
-                </a:solidFill>
                 <a:effectLst/>
               </a:rPr>
               <a:t>BGP </a:t>
             </a:r>
             <a:r>
               <a:rPr lang="en-US" dirty="0" smtClean="0">
-                <a:solidFill>
-                  <a:srgbClr val="FF0000"/>
-                </a:solidFill>
                 <a:effectLst/>
               </a:rPr>
               <a:t>is </a:t>
             </a:r>
             <a:r>
+              <a:rPr lang="en-US" dirty="0" smtClean="0"/>
+              <a:t>a </a:t>
+            </a:r>
+            <a:r>
               <a:rPr lang="en-US" dirty="0" smtClean="0">
-                <a:solidFill>
-                  <a:srgbClr val="FF0000"/>
-                </a:solidFill>
                 <a:effectLst/>
               </a:rPr>
-              <a:t>widely used </a:t>
-            </a:r>
-            <a:r>
-              <a:rPr lang="en-US" dirty="0">
-                <a:solidFill>
-                  <a:srgbClr val="FF0000"/>
-                </a:solidFill>
-                <a:effectLst/>
-              </a:rPr>
-              <a:t>routing protocol </a:t>
+              <a:t>widely </a:t>
             </a:r>
             <a:r>
               <a:rPr lang="en-US" dirty="0" smtClean="0">
-                <a:solidFill>
-                  <a:srgbClr val="FF0000"/>
-                </a:solidFill>
                 <a:effectLst/>
               </a:rPr>
               <a:t>used </a:t>
             </a:r>
             <a:r>
-              <a:rPr lang="en-US" dirty="0" smtClean="0">
-                <a:solidFill>
-                  <a:srgbClr val="FF0000"/>
-                </a:solidFill>
+              <a:rPr lang="en-US" dirty="0">
                 <a:effectLst/>
               </a:rPr>
-              <a:t>to route traffic </a:t>
+              <a:t>routing </a:t>
             </a:r>
             <a:r>
               <a:rPr lang="en-US" dirty="0" smtClean="0">
-                <a:solidFill>
-                  <a:srgbClr val="FF0000"/>
-                </a:solidFill>
                 <a:effectLst/>
               </a:rPr>
-              <a:t>among </a:t>
+              <a:t>protocol to </a:t>
             </a:r>
             <a:r>
               <a:rPr lang="en-US" dirty="0" smtClean="0">
-                <a:solidFill>
-                  <a:srgbClr val="FF0000"/>
-                </a:solidFill>
                 <a:effectLst/>
               </a:rPr>
-              <a:t>gateway </a:t>
+              <a:t>route traffic among gateway </a:t>
             </a:r>
             <a:r>
               <a:rPr lang="en-US" dirty="0">
-                <a:solidFill>
-                  <a:srgbClr val="FF0000"/>
-                </a:solidFill>
                 <a:effectLst/>
               </a:rPr>
               <a:t>hosts in </a:t>
             </a:r>
             <a:r>
               <a:rPr lang="en-US" dirty="0" smtClean="0">
-                <a:solidFill>
-                  <a:srgbClr val="FF0000"/>
-                </a:solidFill>
                 <a:effectLst/>
               </a:rPr>
               <a:t>a </a:t>
             </a:r>
             <a:r>
               <a:rPr lang="en-US" dirty="0">
-                <a:solidFill>
-                  <a:srgbClr val="FF0000"/>
-                </a:solidFill>
                 <a:effectLst/>
               </a:rPr>
               <a:t>network of autonomous </a:t>
             </a:r>
             <a:r>
               <a:rPr lang="en-US" dirty="0" smtClean="0">
-                <a:solidFill>
-                  <a:srgbClr val="FF0000"/>
-                </a:solidFill>
                 <a:effectLst/>
               </a:rPr>
               <a:t>systems (ASs).</a:t>
             </a:r>
             <a:endParaRPr lang="en-US" dirty="0">
-              <a:solidFill>
-                <a:srgbClr val="FF0000"/>
-              </a:solidFill>
               <a:effectLst/>
             </a:endParaRPr>
           </a:p>
           <a:p>
             <a:r>
-              <a:rPr lang="en-US" dirty="0">
-                <a:solidFill>
-                  <a:srgbClr val="FF0000"/>
-                </a:solidFill>
-              </a:rPr>
-              <a:t>BGP uses Transmission Control Protocol (TCP) to create a communication between hosts. </a:t>
+              <a:rPr lang="en-US" dirty="0"/>
+              <a:t>BGP uses Transmission Control Protocol (TCP) to </a:t>
+            </a:r>
+            <a:r>
+              <a:rPr lang="en-US" dirty="0" smtClean="0"/>
+              <a:t>communicate between </a:t>
+            </a:r>
+            <a:r>
+              <a:rPr lang="en-US" dirty="0"/>
+              <a:t>hosts</a:t>
+            </a:r>
+            <a:r>
+              <a:rPr lang="en-US" dirty="0" smtClean="0"/>
+              <a:t>.</a:t>
             </a:r>
           </a:p>
           <a:p>
             <a:r>
               <a:rPr lang="en-US" dirty="0" smtClean="0">
-                <a:solidFill>
-                  <a:srgbClr val="FF0000"/>
-                </a:solidFill>
                 <a:effectLst/>
               </a:rPr>
               <a:t>BGP </a:t>
             </a:r>
             <a:r>
-              <a:rPr lang="en-US" dirty="0" smtClean="0">
-                <a:solidFill>
-                  <a:srgbClr val="FF0000"/>
-                </a:solidFill>
-              </a:rPr>
-              <a:t>routing decision are </a:t>
-            </a:r>
-            <a:r>
-              <a:rPr lang="en-US" dirty="0" smtClean="0">
-                <a:solidFill>
-                  <a:srgbClr val="FF0000"/>
-                </a:solidFill>
-              </a:rPr>
-              <a:t>made using the Best Path Selection, which utilizes known routes/paths </a:t>
-            </a:r>
-            <a:r>
-              <a:rPr lang="en-US" dirty="0" smtClean="0">
-                <a:solidFill>
-                  <a:srgbClr val="FF0000"/>
-                </a:solidFill>
-              </a:rPr>
-              <a:t>and network </a:t>
-            </a:r>
-            <a:r>
-              <a:rPr lang="en-US" dirty="0" smtClean="0">
-                <a:solidFill>
-                  <a:srgbClr val="FF0000"/>
-                </a:solidFill>
-              </a:rPr>
-              <a:t>policies to determine ...</a:t>
+              <a:rPr lang="en-US" dirty="0" smtClean="0"/>
+              <a:t>routing decision are made using the Best Path Selection, which utilizes known routes/paths and </a:t>
+            </a:r>
+            <a:r>
+              <a:rPr lang="en-US" dirty="0" smtClean="0"/>
+              <a:t>network policies to determine routes free of loops.</a:t>
+            </a:r>
+          </a:p>
+          <a:p>
+            <a:r>
+              <a:rPr lang="en-US" dirty="0"/>
+              <a:t>BGP only sends updated routing information when changes occur and </a:t>
+            </a:r>
+            <a:r>
+              <a:rPr lang="en-US" dirty="0" smtClean="0"/>
+              <a:t>transmits only the </a:t>
+            </a:r>
+            <a:r>
+              <a:rPr lang="en-US" dirty="0"/>
+              <a:t>updated information</a:t>
+            </a:r>
+            <a:r>
+              <a:rPr lang="en-US" dirty="0" smtClean="0"/>
+              <a:t>.</a:t>
+            </a:r>
+          </a:p>
+          <a:p>
+            <a:r>
+              <a:rPr lang="en-US" dirty="0"/>
+              <a:t>BGP-4 is the latest version which allows network administrators to configure the routes according to organizational policy statements</a:t>
+            </a:r>
+            <a:r>
+              <a:rPr lang="en-US" dirty="0" smtClean="0"/>
+              <a:t>.</a:t>
             </a:r>
             <a:endParaRPr lang="en-US" dirty="0" smtClean="0">
-              <a:solidFill>
-                <a:srgbClr val="FF0000"/>
-              </a:solidFill>
               <a:effectLst/>
             </a:endParaRPr>
           </a:p>
@@ -6523,25 +6010,37 @@
         <p:spPr/>
         <p:txBody>
           <a:bodyPr>
-            <a:normAutofit/>
+            <a:normAutofit fontScale="92500"/>
           </a:bodyPr>
           <a:lstStyle/>
           <a:p>
+            <a:r>
+              <a:rPr lang="en-US" dirty="0" smtClean="0">
+                <a:effectLst/>
+              </a:rPr>
+              <a:t>BGP </a:t>
+            </a:r>
             <a:r>
               <a:rPr lang="en-US" dirty="0">
                 <a:effectLst/>
               </a:rPr>
-              <a:t>BGP </a:t>
+              <a:t>is </a:t>
             </a:r>
             <a:r>
               <a:rPr lang="en-US" dirty="0" smtClean="0">
                 <a:effectLst/>
               </a:rPr>
-              <a:t>only sends updated routin</a:t>
+              <a:t>popular </a:t>
+            </a:r>
+            <a:r>
+              <a:rPr lang="en-US" dirty="0">
+                <a:effectLst/>
+              </a:rPr>
+              <a:t>among </a:t>
             </a:r>
             <a:r>
               <a:rPr lang="en-US" dirty="0" smtClean="0"/>
-              <a:t>g information when changes occur and only transmit the updated information</a:t>
+              <a:t>network administrators of multiple ISPs or single ISPs with a need to connect with other network providers</a:t>
             </a:r>
             <a:r>
               <a:rPr lang="en-US" dirty="0" smtClean="0">
@@ -6549,11 +6048,42 @@
               </a:rPr>
               <a:t>.</a:t>
             </a:r>
-            <a:endParaRPr lang="en-US" dirty="0" smtClean="0">
-              <a:effectLst/>
-            </a:endParaRPr>
-          </a:p>
-          <a:p>
+          </a:p>
+          <a:p>
+            <a:r>
+              <a:rPr lang="en-US" dirty="0" smtClean="0">
+                <a:effectLst/>
+              </a:rPr>
+              <a:t>BGP can be used to join a number </a:t>
+            </a:r>
+            <a:r>
+              <a:rPr lang="en-US" dirty="0">
+                <a:effectLst/>
+              </a:rPr>
+              <a:t>of </a:t>
+            </a:r>
+            <a:r>
+              <a:rPr lang="en-US" dirty="0" smtClean="0">
+                <a:effectLst/>
+              </a:rPr>
+              <a:t>Open </a:t>
+            </a:r>
+            <a:r>
+              <a:rPr lang="en-US" dirty="0"/>
+              <a:t>S</a:t>
+            </a:r>
+            <a:r>
+              <a:rPr lang="en-US" dirty="0" smtClean="0">
+                <a:effectLst/>
+              </a:rPr>
+              <a:t>hortest Path First (OSPF) </a:t>
+            </a:r>
+            <a:r>
+              <a:rPr lang="en-US" dirty="0">
+                <a:effectLst/>
+              </a:rPr>
+              <a:t>networks</a:t>
+            </a:r>
             <a:r>
               <a:rPr lang="en-US" dirty="0" smtClean="0">
                 <a:solidFill>
@@ -6561,43 +6091,59 @@
                 </a:solidFill>
                 <a:effectLst/>
               </a:rPr>
-              <a:t>BGP-4 is the latest version which facilitates the administrators to configure the cost matric according to organization policy statement.</a:t>
+              <a:t>.</a:t>
+            </a:r>
+          </a:p>
+          <a:p>
+            <a:r>
+              <a:rPr lang="en-US" dirty="0"/>
+              <a:t>BGP is also used by may large private IP networks internally where OSPF by itself would not scale</a:t>
             </a:r>
           </a:p>
           <a:p>
             <a:r>
               <a:rPr lang="en-US" dirty="0" smtClean="0">
-                <a:solidFill>
-                  <a:srgbClr val="FF0000"/>
-                </a:solidFill>
                 <a:effectLst/>
               </a:rPr>
-              <a:t>The Anti-loop </a:t>
+              <a:t>BGP </a:t>
             </a:r>
             <a:r>
               <a:rPr lang="en-US" dirty="0">
-                <a:solidFill>
-                  <a:srgbClr val="FF0000"/>
-                </a:solidFill>
                 <a:effectLst/>
               </a:rPr>
-              <a:t>mechanism is the critical aspect of BGP. Any routes that exist in the AS path will not be import by any router. </a:t>
-            </a:r>
-            <a:endParaRPr lang="en-US" dirty="0" smtClean="0">
-              <a:solidFill>
-                <a:srgbClr val="FF0000"/>
-              </a:solidFill>
-              <a:effectLst/>
-            </a:endParaRPr>
-          </a:p>
-          <a:p>
+              <a:t>is </a:t>
+            </a:r>
+            <a:r>
+              <a:rPr lang="en-US" dirty="0" smtClean="0">
+                <a:effectLst/>
+              </a:rPr>
+              <a:t>important </a:t>
+            </a:r>
+            <a:r>
+              <a:rPr lang="en-US" dirty="0">
+                <a:effectLst/>
+              </a:rPr>
+              <a:t>in </a:t>
+            </a:r>
+            <a:r>
+              <a:rPr lang="en-US" dirty="0" smtClean="0">
+                <a:effectLst/>
+              </a:rPr>
+              <a:t>multi-homing </a:t>
+            </a:r>
+            <a:r>
+              <a:rPr lang="en-US" dirty="0" smtClean="0">
+                <a:effectLst/>
+              </a:rPr>
+              <a:t>networks, creating a reliable connections that give better redundancy instead of multiple access points.</a:t>
+            </a:r>
             <a:endParaRPr lang="en-US" dirty="0"/>
           </a:p>
         </p:txBody>
       </p:sp>
       <p:sp>
         <p:nvSpPr>
-          <p:cNvPr id="4" name="Vertical Title 3"/>
+          <p:cNvPr id="4" name="Title 3"/>
           <p:cNvSpPr>
             <a:spLocks noGrp="1"/>
           </p:cNvSpPr>
@@ -6607,8 +6153,8 @@
         </p:nvSpPr>
         <p:spPr>
           <a:xfrm>
-            <a:off x="228600" y="274638"/>
-            <a:ext cx="8724900" cy="1143000"/>
+            <a:off x="133350" y="274638"/>
+            <a:ext cx="8801100" cy="1143000"/>
           </a:xfrm>
         </p:spPr>
         <p:txBody>
@@ -6617,21 +6163,14 @@
           </a:bodyPr>
           <a:lstStyle/>
           <a:p>
-            <a:r>
-              <a:rPr lang="en-US" dirty="0">
-                <a:solidFill>
-                  <a:srgbClr val="000090"/>
-                </a:solidFill>
-              </a:rPr>
-              <a:t>Border Gateway Protocol (BGP</a:t>
-            </a:r>
+            <a:pPr lvl="0"/>
             <a:r>
               <a:rPr lang="en-US" dirty="0" smtClean="0">
                 <a:solidFill>
                   <a:srgbClr val="000090"/>
                 </a:solidFill>
               </a:rPr>
-              <a:t>) (cont.) </a:t>
+              <a:t>Popularity and Use of BGP in Information Technology Applications</a:t>
             </a:r>
             <a:endParaRPr lang="en-US" dirty="0"/>
           </a:p>
@@ -6640,7 +6179,7 @@
     </p:spTree>
     <p:extLst>
       <p:ext uri="{BB962C8B-B14F-4D97-AF65-F5344CB8AC3E}">
-        <p14:creationId xmlns:p14="http://schemas.microsoft.com/office/powerpoint/2010/main" val="825725167"/>
+        <p14:creationId xmlns:p14="http://schemas.microsoft.com/office/powerpoint/2010/main" val="2543813598"/>
       </p:ext>
     </p:extLst>
   </p:cSld>
@@ -6676,7 +6215,7 @@
       </p:grpSpPr>
       <p:sp>
         <p:nvSpPr>
-          <p:cNvPr id="5" name="Vertical Text Placeholder 4"/>
+          <p:cNvPr id="3" name="Vertical Text Placeholder 2"/>
           <p:cNvSpPr>
             <a:spLocks noGrp="1"/>
           </p:cNvSpPr>
@@ -6687,126 +6226,130 @@
         <p:spPr/>
         <p:txBody>
           <a:bodyPr>
-            <a:normAutofit fontScale="92500"/>
+            <a:normAutofit lnSpcReduction="10000"/>
           </a:bodyPr>
           <a:lstStyle/>
           <a:p>
             <a:r>
-              <a:rPr lang="en-US" dirty="0" smtClean="0">
+              <a:rPr lang="en-SG" dirty="0" smtClean="0">
                 <a:effectLst/>
               </a:rPr>
-              <a:t>BGP </a:t>
-            </a:r>
-            <a:r>
-              <a:rPr lang="en-US" dirty="0">
+              <a:t>Advantages</a:t>
+            </a:r>
+          </a:p>
+          <a:p>
+            <a:pPr lvl="1"/>
+            <a:r>
+              <a:rPr lang="en-SG" dirty="0" smtClean="0">
                 <a:effectLst/>
               </a:rPr>
-              <a:t>is </a:t>
-            </a:r>
-            <a:r>
-              <a:rPr lang="en-US" dirty="0" smtClean="0">
+              <a:t>Only </a:t>
+            </a:r>
+            <a:r>
+              <a:rPr lang="en-SG" dirty="0" smtClean="0">
                 <a:effectLst/>
               </a:rPr>
-              <a:t>popular </a:t>
-            </a:r>
-            <a:r>
-              <a:rPr lang="en-US" dirty="0">
+              <a:t>one </a:t>
+            </a:r>
+            <a:r>
+              <a:rPr lang="en-SG" dirty="0">
                 <a:effectLst/>
               </a:rPr>
-              <a:t>among </a:t>
-            </a:r>
-            <a:r>
-              <a:rPr lang="en-US" dirty="0" smtClean="0"/>
-              <a:t>network administrators of multiple ISPs or single ISPs with a need to connect with other network providers</a:t>
-            </a:r>
-            <a:r>
-              <a:rPr lang="en-US" dirty="0" smtClean="0">
+              <a:t>active route for a prefix at a </a:t>
+            </a:r>
+            <a:r>
+              <a:rPr lang="en-SG" dirty="0" smtClean="0">
                 <a:effectLst/>
               </a:rPr>
-              <a:t>.</a:t>
-            </a:r>
-          </a:p>
-          <a:p>
-            <a:r>
-              <a:rPr lang="en-US" dirty="0" smtClean="0">
+              <a:t>time</a:t>
+            </a:r>
+            <a:endParaRPr lang="en-US" dirty="0" smtClean="0">
+              <a:effectLst/>
+            </a:endParaRPr>
+          </a:p>
+          <a:p>
+            <a:pPr lvl="1"/>
+            <a:r>
+              <a:rPr lang="en-SG" dirty="0" smtClean="0">
                 <a:effectLst/>
               </a:rPr>
-              <a:t>BGP can be used to join a number </a:t>
-            </a:r>
-            <a:r>
-              <a:rPr lang="en-US" dirty="0">
+              <a:t>Ensures the </a:t>
+            </a:r>
+            <a:r>
+              <a:rPr lang="en-SG" dirty="0">
                 <a:effectLst/>
               </a:rPr>
-              <a:t>of </a:t>
-            </a:r>
-            <a:r>
-              <a:rPr lang="en-US" dirty="0" smtClean="0">
+              <a:t>decision process between multiple routes does not cause </a:t>
+            </a:r>
+            <a:r>
+              <a:rPr lang="en-SG" dirty="0" smtClean="0">
                 <a:effectLst/>
               </a:rPr>
-              <a:t>Open </a:t>
-            </a:r>
-            <a:r>
-              <a:rPr lang="en-US" dirty="0"/>
-              <a:t>S</a:t>
-            </a:r>
-            <a:r>
-              <a:rPr lang="en-US" dirty="0" smtClean="0">
+              <a:t>loops.</a:t>
+            </a:r>
+          </a:p>
+          <a:p>
+            <a:pPr lvl="1"/>
+            <a:r>
+              <a:rPr lang="en-SG" dirty="0" smtClean="0">
                 <a:effectLst/>
               </a:rPr>
-              <a:t>hortest Path First (OSPF) </a:t>
-            </a:r>
-            <a:r>
-              <a:rPr lang="en-US" dirty="0">
+              <a:t>Blocks source of bad traffic</a:t>
+            </a:r>
+          </a:p>
+          <a:p>
+            <a:pPr lvl="1"/>
+            <a:r>
+              <a:rPr lang="en-SG" dirty="0" smtClean="0"/>
+              <a:t>Provides IP </a:t>
+            </a:r>
+            <a:r>
+              <a:rPr lang="en-SG" dirty="0" smtClean="0"/>
+              <a:t>stability</a:t>
+            </a:r>
+            <a:endParaRPr lang="en-US" dirty="0">
+              <a:solidFill>
+                <a:srgbClr val="FF0000"/>
+              </a:solidFill>
+              <a:effectLst/>
+            </a:endParaRPr>
+          </a:p>
+          <a:p>
+            <a:pPr lvl="0"/>
+            <a:r>
+              <a:rPr lang="en-SG" dirty="0" smtClean="0">
                 <a:effectLst/>
               </a:rPr>
-              <a:t>networks</a:t>
-            </a:r>
-            <a:r>
-              <a:rPr lang="en-US" dirty="0" smtClean="0">
-                <a:solidFill>
-                  <a:srgbClr val="FF0000"/>
-                </a:solidFill>
-                <a:effectLst/>
-              </a:rPr>
+              <a:t>Disadvantages</a:t>
+            </a:r>
+          </a:p>
+          <a:p>
+            <a:pPr lvl="1"/>
+            <a:r>
+              <a:rPr lang="en-SG" dirty="0"/>
+              <a:t>Found to be vulnerable to attacks and misconfigurations</a:t>
+            </a:r>
+            <a:r>
+              <a:rPr lang="en-US" dirty="0"/>
               <a:t>.</a:t>
             </a:r>
           </a:p>
           <a:p>
+            <a:pPr lvl="1"/>
             <a:r>
               <a:rPr lang="en-US" dirty="0"/>
-              <a:t>BGP is also used by may large private IP networks internally where OSPF by itself would not scale</a:t>
-            </a:r>
-          </a:p>
-          <a:p>
-            <a:r>
-              <a:rPr lang="en-US" dirty="0" smtClean="0">
-                <a:effectLst/>
-              </a:rPr>
-              <a:t>BGP </a:t>
-            </a:r>
-            <a:r>
-              <a:rPr lang="en-US" dirty="0">
-                <a:effectLst/>
-              </a:rPr>
-              <a:t>is </a:t>
-            </a:r>
-            <a:r>
-              <a:rPr lang="en-US" dirty="0" smtClean="0">
-                <a:effectLst/>
-              </a:rPr>
-              <a:t>important </a:t>
-            </a:r>
-            <a:r>
-              <a:rPr lang="en-US" dirty="0">
-                <a:effectLst/>
-              </a:rPr>
-              <a:t>in multi homing </a:t>
-            </a:r>
-            <a:r>
-              <a:rPr lang="en-US" dirty="0" smtClean="0">
-                <a:effectLst/>
-              </a:rPr>
-              <a:t>networks, creating a reliable connections that give better redundancy instead of multiple access points.</a:t>
+              <a:t>Congestion control/monitoring is not performed</a:t>
+            </a:r>
+          </a:p>
+          <a:p>
+            <a:pPr lvl="1"/>
+            <a:r>
+              <a:rPr lang="en-US" dirty="0"/>
+              <a:t>Inability to load balance traffic across multiple connections during high </a:t>
+            </a:r>
+            <a:r>
+              <a:rPr lang="en-US" dirty="0" smtClean="0"/>
+              <a:t>load</a:t>
             </a:r>
             <a:endParaRPr lang="en-US" dirty="0"/>
           </a:p>
@@ -6814,7 +6357,7 @@
       </p:sp>
       <p:sp>
         <p:nvSpPr>
-          <p:cNvPr id="4" name="Title 3"/>
+          <p:cNvPr id="2" name="Title 1"/>
           <p:cNvSpPr>
             <a:spLocks noGrp="1"/>
           </p:cNvSpPr>
@@ -6824,8 +6367,8 @@
         </p:nvSpPr>
         <p:spPr>
           <a:xfrm>
-            <a:off x="133350" y="274638"/>
-            <a:ext cx="8801100" cy="1143000"/>
+            <a:off x="638355" y="274638"/>
+            <a:ext cx="7729268" cy="1143000"/>
           </a:xfrm>
         </p:spPr>
         <p:txBody>
@@ -6834,23 +6377,37 @@
           </a:bodyPr>
           <a:lstStyle/>
           <a:p>
-            <a:pPr lvl="0"/>
+            <a:r>
+              <a:rPr lang="en-US" dirty="0">
+                <a:solidFill>
+                  <a:srgbClr val="000090"/>
+                </a:solidFill>
+              </a:rPr>
+              <a:t>Advantages </a:t>
+            </a:r>
             <a:r>
               <a:rPr lang="en-US" dirty="0" smtClean="0">
                 <a:solidFill>
                   <a:srgbClr val="000090"/>
                 </a:solidFill>
               </a:rPr>
-              <a:t>Popularity and Use of BGP in Information Technology Applications</a:t>
-            </a:r>
-            <a:endParaRPr lang="en-US" dirty="0"/>
+              <a:t>and Disadvantages of </a:t>
+            </a:r>
+            <a:r>
+              <a:rPr lang="en-US" dirty="0">
+                <a:solidFill>
+                  <a:srgbClr val="000090"/>
+                </a:solidFill>
+              </a:rPr>
+              <a:t>BGP </a:t>
+            </a:r>
           </a:p>
         </p:txBody>
       </p:sp>
     </p:spTree>
     <p:extLst>
       <p:ext uri="{BB962C8B-B14F-4D97-AF65-F5344CB8AC3E}">
-        <p14:creationId xmlns:p14="http://schemas.microsoft.com/office/powerpoint/2010/main" val="2543813598"/>
+        <p14:creationId xmlns:p14="http://schemas.microsoft.com/office/powerpoint/2010/main" val="452872443"/>
       </p:ext>
     </p:extLst>
   </p:cSld>
@@ -6886,7 +6443,7 @@
       </p:grpSpPr>
       <p:sp>
         <p:nvSpPr>
-          <p:cNvPr id="3" name="Vertical Text Placeholder 2"/>
+          <p:cNvPr id="5" name="Vertical Text Placeholder 4"/>
           <p:cNvSpPr>
             <a:spLocks noGrp="1"/>
           </p:cNvSpPr>
@@ -6901,91 +6458,134 @@
           </a:bodyPr>
           <a:lstStyle/>
           <a:p>
-            <a:r>
-              <a:rPr lang="en-SG" dirty="0" smtClean="0">
+            <a:pPr marL="342900" lvl="1" indent="-342900">
+              <a:spcAft>
+                <a:spcPts val="2000"/>
+              </a:spcAft>
+            </a:pPr>
+            <a:r>
+              <a:rPr lang="en-US" sz="2400" dirty="0" smtClean="0">
                 <a:effectLst/>
               </a:rPr>
-              <a:t>Only one </a:t>
-            </a:r>
-            <a:r>
-              <a:rPr lang="en-SG" dirty="0">
+              <a:t>The </a:t>
+            </a:r>
+            <a:r>
+              <a:rPr lang="en-US" sz="2400" dirty="0">
                 <a:effectLst/>
               </a:rPr>
-              <a:t>active route for a prefix at a </a:t>
-            </a:r>
-            <a:r>
-              <a:rPr lang="en-SG" dirty="0" smtClean="0">
+              <a:t>primary function of a BGP </a:t>
+            </a:r>
+            <a:r>
+              <a:rPr lang="en-US" sz="2400" dirty="0" smtClean="0">
                 <a:effectLst/>
               </a:rPr>
-              <a:t>time</a:t>
-            </a:r>
-            <a:endParaRPr lang="en-US" dirty="0" smtClean="0">
-              <a:effectLst/>
-            </a:endParaRPr>
-          </a:p>
-          <a:p>
-            <a:pPr lvl="0"/>
-            <a:r>
-              <a:rPr lang="en-SG" dirty="0" smtClean="0">
+              <a:t>speaker </a:t>
+            </a:r>
+            <a:r>
+              <a:rPr lang="en-US" sz="2400" dirty="0" smtClean="0">
                 <a:effectLst/>
               </a:rPr>
-              <a:t>Ensures the </a:t>
-            </a:r>
-            <a:r>
-              <a:rPr lang="en-SG" dirty="0">
+              <a:t>is </a:t>
+            </a:r>
+            <a:r>
+              <a:rPr lang="en-US" sz="2400" dirty="0">
                 <a:effectLst/>
               </a:rPr>
-              <a:t>decision process between multiple routes does not cause </a:t>
-            </a:r>
-            <a:r>
-              <a:rPr lang="en-SG" dirty="0" smtClean="0">
+              <a:t>to exchange network reachability information with other BGP systems</a:t>
+            </a:r>
+            <a:r>
+              <a:rPr lang="en-US" sz="2400" dirty="0" smtClean="0">
                 <a:effectLst/>
               </a:rPr>
-              <a:t>loops.</a:t>
-            </a:r>
-          </a:p>
-          <a:p>
-            <a:r>
-              <a:rPr lang="en-SG" dirty="0" smtClean="0">
-                <a:effectLst/>
-              </a:rPr>
-              <a:t>Blocks source of bad traffic</a:t>
-            </a:r>
-          </a:p>
-          <a:p>
-            <a:r>
-              <a:rPr lang="en-SG" dirty="0" smtClean="0"/>
-              <a:t>Provides IP stability</a:t>
-            </a:r>
-          </a:p>
-          <a:p>
-            <a:endParaRPr lang="en-US" dirty="0">
+              <a:t>.</a:t>
+            </a:r>
+          </a:p>
+          <a:p>
+            <a:pPr marL="342900" lvl="1" indent="-342900">
+              <a:spcAft>
+                <a:spcPts val="2000"/>
+              </a:spcAft>
+            </a:pPr>
+            <a:r>
+              <a:rPr lang="en-US" sz="2400" dirty="0" smtClean="0"/>
+              <a:t>This is accomplished through use of the Best Path Selection </a:t>
+            </a:r>
+            <a:r>
+              <a:rPr lang="en-US" sz="2400" dirty="0" smtClean="0"/>
+              <a:t>Algorithm</a:t>
+            </a:r>
+          </a:p>
+          <a:p>
+            <a:pPr marL="580644" lvl="2" indent="-342900">
+              <a:spcAft>
+                <a:spcPts val="2000"/>
+              </a:spcAft>
+            </a:pPr>
+            <a:r>
+              <a:rPr lang="en-US" sz="2000" dirty="0" smtClean="0"/>
+              <a:t>Reducing </a:t>
+            </a:r>
+            <a:r>
+              <a:rPr lang="en-US" sz="2000" dirty="0"/>
+              <a:t>routing and forwarding changes in a network, creating a more stable network</a:t>
+            </a:r>
+          </a:p>
+          <a:p>
+            <a:pPr marL="580644" lvl="2" indent="-342900">
+              <a:spcAft>
+                <a:spcPts val="2000"/>
+              </a:spcAft>
+            </a:pPr>
+            <a:r>
+              <a:rPr lang="en-US" sz="2200" dirty="0"/>
+              <a:t>Quickly </a:t>
+            </a:r>
+            <a:r>
+              <a:rPr lang="en-US" sz="2200" dirty="0" smtClean="0"/>
+              <a:t>identifying </a:t>
+            </a:r>
+            <a:r>
+              <a:rPr lang="en-US" sz="2200" dirty="0"/>
+              <a:t>and </a:t>
+            </a:r>
+            <a:r>
+              <a:rPr lang="en-US" sz="2200" dirty="0" smtClean="0"/>
+              <a:t>removing </a:t>
+            </a:r>
+            <a:r>
+              <a:rPr lang="en-US" sz="2200" dirty="0"/>
+              <a:t>any routing loops</a:t>
+            </a:r>
+          </a:p>
+          <a:p>
+            <a:pPr marL="580644" lvl="2" indent="-342900">
+              <a:spcAft>
+                <a:spcPts val="2000"/>
+              </a:spcAft>
+            </a:pPr>
+            <a:r>
+              <a:rPr lang="en-US" sz="2200" dirty="0" smtClean="0"/>
+              <a:t>Enforcing </a:t>
+            </a:r>
+            <a:r>
+              <a:rPr lang="en-US" sz="2200" dirty="0"/>
+              <a:t>policy </a:t>
+            </a:r>
+            <a:r>
+              <a:rPr lang="en-US" sz="2200" dirty="0" smtClean="0"/>
+              <a:t>decisions</a:t>
+            </a:r>
+            <a:endParaRPr lang="en-US" sz="2400" dirty="0" smtClean="0">
               <a:solidFill>
                 <a:srgbClr val="FF0000"/>
               </a:solidFill>
-              <a:effectLst/>
             </a:endParaRPr>
           </a:p>
-          <a:p>
-            <a:pPr lvl="0"/>
-            <a:endParaRPr lang="en-SG" dirty="0" smtClean="0">
-              <a:effectLst/>
-            </a:endParaRPr>
-          </a:p>
-          <a:p>
-            <a:pPr lvl="0"/>
-            <a:endParaRPr lang="en-US" dirty="0">
-              <a:effectLst/>
-            </a:endParaRPr>
-          </a:p>
-          <a:p>
-            <a:endParaRPr lang="en-US" dirty="0"/>
-          </a:p>
-        </p:txBody>
-      </p:sp>
-      <p:sp>
-        <p:nvSpPr>
-          <p:cNvPr id="2" name="Title 1"/>
+        </p:txBody>
+      </p:sp>
+      <p:sp>
+        <p:nvSpPr>
+          <p:cNvPr id="4" name="Title 3"/>
           <p:cNvSpPr>
             <a:spLocks noGrp="1"/>
           </p:cNvSpPr>
@@ -7000,37 +6600,27 @@
           </a:bodyPr>
           <a:lstStyle/>
           <a:p>
-            <a:r>
-              <a:rPr lang="en-US" dirty="0">
-                <a:solidFill>
-                  <a:srgbClr val="000090"/>
-                </a:solidFill>
-              </a:rPr>
-              <a:t>Advantages </a:t>
-            </a:r>
+            <a:pPr lvl="0"/>
             <a:r>
               <a:rPr lang="en-US" dirty="0" smtClean="0">
                 <a:solidFill>
                   <a:srgbClr val="000090"/>
                 </a:solidFill>
               </a:rPr>
-              <a:t>of </a:t>
-            </a:r>
-            <a:r>
-              <a:rPr lang="en-US" dirty="0">
-                <a:solidFill>
-                  <a:srgbClr val="000090"/>
-                </a:solidFill>
-              </a:rPr>
-              <a:t>BGP </a:t>
-            </a:r>
+              <a:t>Reasons for Implementation</a:t>
+            </a:r>
+            <a:endParaRPr lang="en-US" dirty="0">
+              <a:solidFill>
+                <a:srgbClr val="000090"/>
+              </a:solidFill>
+            </a:endParaRPr>
           </a:p>
         </p:txBody>
       </p:sp>
     </p:spTree>
     <p:extLst>
       <p:ext uri="{BB962C8B-B14F-4D97-AF65-F5344CB8AC3E}">
-        <p14:creationId xmlns:p14="http://schemas.microsoft.com/office/powerpoint/2010/main" val="452872443"/>
+        <p14:creationId xmlns:p14="http://schemas.microsoft.com/office/powerpoint/2010/main" val="726320851"/>
       </p:ext>
     </p:extLst>
   </p:cSld>
@@ -7066,7 +6656,7 @@
       </p:grpSpPr>
       <p:sp>
         <p:nvSpPr>
-          <p:cNvPr id="3" name="Vertical Text Placeholder 2"/>
+          <p:cNvPr id="5" name="Vertical Text Placeholder 4"/>
           <p:cNvSpPr>
             <a:spLocks noGrp="1"/>
           </p:cNvSpPr>
@@ -7074,53 +6664,143 @@
             <p:ph idx="1"/>
           </p:nvPr>
         </p:nvSpPr>
-        <p:spPr/>
-        <p:txBody>
-          <a:bodyPr/>
+        <p:spPr>
+          <a:xfrm>
+            <a:off x="171450" y="1417638"/>
+            <a:ext cx="8724900" cy="5173662"/>
+          </a:xfrm>
+        </p:spPr>
+        <p:txBody>
+          <a:bodyPr>
+            <a:normAutofit fontScale="62500" lnSpcReduction="20000"/>
+          </a:bodyPr>
           <a:lstStyle/>
           <a:p>
-            <a:r>
-              <a:rPr lang="en-SG" dirty="0" smtClean="0">
-                <a:effectLst/>
-              </a:rPr>
-              <a:t>Found to </a:t>
-            </a:r>
-            <a:r>
-              <a:rPr lang="en-SG" dirty="0">
-                <a:effectLst/>
-              </a:rPr>
-              <a:t>be vulnerable to attacks and </a:t>
-            </a:r>
-            <a:r>
-              <a:rPr lang="en-SG" dirty="0" smtClean="0">
-                <a:effectLst/>
-              </a:rPr>
-              <a:t>misconfigurations</a:t>
-            </a:r>
-            <a:r>
-              <a:rPr lang="en-US" dirty="0" smtClean="0">
-                <a:effectLst/>
-              </a:rPr>
-              <a:t>.</a:t>
-            </a:r>
-          </a:p>
-          <a:p>
-            <a:r>
-              <a:rPr lang="en-US" dirty="0" smtClean="0">
-                <a:effectLst/>
-              </a:rPr>
-              <a:t>Congestion control/monitoring is not performed</a:t>
-            </a:r>
-          </a:p>
-          <a:p>
             <a:pPr lvl="0"/>
             <a:r>
-              <a:rPr lang="en-US" dirty="0"/>
-              <a:t>Inability to load balance traffic across multiple connections during high load</a:t>
-            </a:r>
-          </a:p>
-          <a:p>
-            <a:endParaRPr lang="en-US" dirty="0">
+              <a:rPr lang="en-US" sz="2800" dirty="0" smtClean="0"/>
+              <a:t>Prefer </a:t>
+            </a:r>
+            <a:r>
+              <a:rPr lang="en-US" sz="2800" dirty="0"/>
+              <a:t>the route with highest WEIGHT [</a:t>
+            </a:r>
+            <a:r>
+              <a:rPr lang="en-US" sz="2800" dirty="0" smtClean="0"/>
+              <a:t>Cisco-specific, </a:t>
+            </a:r>
+            <a:r>
+              <a:rPr lang="en-US" sz="2800" dirty="0"/>
+              <a:t>local to the router].</a:t>
+            </a:r>
+          </a:p>
+          <a:p>
+            <a:pPr lvl="0"/>
+            <a:r>
+              <a:rPr lang="en-US" sz="2800" dirty="0"/>
+              <a:t>Prefer the route with highest </a:t>
+            </a:r>
+            <a:r>
+              <a:rPr lang="en-US" sz="2800" dirty="0" smtClean="0"/>
+              <a:t>LOCAL_PERF [Local within an AS].</a:t>
+            </a:r>
+          </a:p>
+          <a:p>
+            <a:pPr lvl="0"/>
+            <a:r>
+              <a:rPr lang="en-US" sz="2800" dirty="0" smtClean="0"/>
+              <a:t>Prefer locally originated routes.</a:t>
+            </a:r>
+          </a:p>
+          <a:p>
+            <a:pPr lvl="0"/>
+            <a:r>
+              <a:rPr lang="en-US" sz="2800" dirty="0" smtClean="0"/>
+              <a:t>Prefer </a:t>
+            </a:r>
+            <a:r>
+              <a:rPr lang="en-US" sz="2800" dirty="0"/>
+              <a:t>the route with the shortest AS_PATH.</a:t>
+            </a:r>
+          </a:p>
+          <a:p>
+            <a:pPr lvl="0"/>
+            <a:r>
+              <a:rPr lang="en-US" sz="2800" dirty="0"/>
+              <a:t>Prefer the route with lowest origin code (i.e. </a:t>
+            </a:r>
+            <a:r>
+              <a:rPr lang="en-US" sz="2800" dirty="0" smtClean="0"/>
+              <a:t>In order of preference: IGP, EGP, incomplete routes).</a:t>
+            </a:r>
+            <a:endParaRPr lang="en-US" sz="2800" dirty="0"/>
+          </a:p>
+          <a:p>
+            <a:pPr lvl="0"/>
+            <a:r>
+              <a:rPr lang="en-US" sz="2800" dirty="0"/>
+              <a:t>Prefer the route with the lowest multi-exit discriminator (MED).</a:t>
+            </a:r>
+          </a:p>
+          <a:p>
+            <a:pPr lvl="0"/>
+            <a:r>
+              <a:rPr lang="en-US" sz="2800" dirty="0"/>
+              <a:t>Prefer EBGP learnt routes over IBGP learnt routes. If best route is selected, skip </a:t>
+            </a:r>
+            <a:r>
+              <a:rPr lang="en-US" sz="2800" dirty="0" smtClean="0"/>
+              <a:t>next step</a:t>
+            </a:r>
+            <a:endParaRPr lang="en-US" sz="2800" dirty="0"/>
+          </a:p>
+          <a:p>
+            <a:pPr lvl="0"/>
+            <a:r>
+              <a:rPr lang="en-US" sz="2800" dirty="0"/>
+              <a:t>Prefer the route with the smallest IGP metric to the BGP next-hop.</a:t>
+            </a:r>
+          </a:p>
+          <a:p>
+            <a:pPr lvl="0"/>
+            <a:r>
+              <a:rPr lang="en-US" sz="2800" dirty="0"/>
+              <a:t>Determine if multiple routes require installation into the routing table for BGP Multipath. If best route is not selected, continue to </a:t>
+            </a:r>
+            <a:r>
+              <a:rPr lang="en-US" sz="2800" dirty="0" smtClean="0"/>
+              <a:t>next step</a:t>
+            </a:r>
+            <a:endParaRPr lang="en-US" sz="2800" dirty="0"/>
+          </a:p>
+          <a:p>
+            <a:pPr lvl="0"/>
+            <a:r>
+              <a:rPr lang="en-US" sz="2800" dirty="0"/>
+              <a:t>When both routes are external, prefer the oldest route (received first)</a:t>
+            </a:r>
+          </a:p>
+          <a:p>
+            <a:pPr lvl="0"/>
+            <a:r>
+              <a:rPr lang="en-US" sz="2800" dirty="0" smtClean="0"/>
+              <a:t>Prefer the route from the BGP router with the lowest router ID.</a:t>
+            </a:r>
+          </a:p>
+          <a:p>
+            <a:pPr lvl="0"/>
+            <a:r>
+              <a:rPr lang="en-US" sz="2800" dirty="0" smtClean="0"/>
+              <a:t>When both router IDs are the same for multiple routes, prefer the route with the smallest cluster list.</a:t>
+            </a:r>
+          </a:p>
+          <a:p>
+            <a:pPr lvl="0"/>
+            <a:r>
+              <a:rPr lang="en-US" sz="2800" dirty="0" smtClean="0"/>
+              <a:t>Prefer the route with the lowest neighbor address.</a:t>
+            </a:r>
+            <a:endParaRPr lang="en-US" sz="2200" dirty="0">
               <a:solidFill>
                 <a:srgbClr val="FF0000"/>
               </a:solidFill>
@@ -7140,45 +6820,27 @@
         </p:nvSpPr>
         <p:spPr/>
         <p:txBody>
-          <a:bodyPr/>
+          <a:bodyPr>
+            <a:normAutofit/>
+          </a:bodyPr>
           <a:lstStyle/>
           <a:p>
             <a:r>
-              <a:rPr lang="en-SG" dirty="0">
+              <a:rPr lang="en-US" dirty="0" smtClean="0">
                 <a:solidFill>
                   <a:srgbClr val="000090"/>
                 </a:solidFill>
               </a:rPr>
-              <a:t>D</a:t>
-            </a:r>
-            <a:r>
-              <a:rPr lang="en-SG" dirty="0" smtClean="0">
-                <a:solidFill>
-                  <a:srgbClr val="000090"/>
-                </a:solidFill>
-              </a:rPr>
-              <a:t>isadvantages </a:t>
-            </a:r>
-            <a:r>
-              <a:rPr lang="en-SG" dirty="0">
-                <a:solidFill>
-                  <a:srgbClr val="000090"/>
-                </a:solidFill>
-              </a:rPr>
-              <a:t>of BGP </a:t>
-            </a:r>
-            <a:endParaRPr lang="en-US" dirty="0">
-              <a:solidFill>
-                <a:srgbClr val="000090"/>
-              </a:solidFill>
-            </a:endParaRPr>
+              <a:t>Best Path Selection Algorithm</a:t>
+            </a:r>
+            <a:endParaRPr lang="en-US" dirty="0"/>
           </a:p>
         </p:txBody>
       </p:sp>
     </p:spTree>
     <p:extLst>
       <p:ext uri="{BB962C8B-B14F-4D97-AF65-F5344CB8AC3E}">
-        <p14:creationId xmlns:p14="http://schemas.microsoft.com/office/powerpoint/2010/main" val="1504518836"/>
+        <p14:creationId xmlns:p14="http://schemas.microsoft.com/office/powerpoint/2010/main" val="1817177015"/>
       </p:ext>
     </p:extLst>
   </p:cSld>
@@ -7214,7 +6876,7 @@
       </p:grpSpPr>
       <p:sp>
         <p:nvSpPr>
-          <p:cNvPr id="5" name="Vertical Text Placeholder 4"/>
+          <p:cNvPr id="3" name="Vertical Text Placeholder 2"/>
           <p:cNvSpPr>
             <a:spLocks noGrp="1"/>
           </p:cNvSpPr>
@@ -7222,137 +6884,183 @@
             <p:ph idx="1"/>
           </p:nvPr>
         </p:nvSpPr>
-        <p:spPr/>
+        <p:spPr>
+          <a:xfrm>
+            <a:off x="457200" y="1417320"/>
+            <a:ext cx="8229600" cy="4924103"/>
+          </a:xfrm>
+        </p:spPr>
         <p:txBody>
           <a:bodyPr>
-            <a:normAutofit lnSpcReduction="10000"/>
+            <a:normAutofit fontScale="70000" lnSpcReduction="20000"/>
           </a:bodyPr>
           <a:lstStyle/>
           <a:p>
-            <a:pPr marL="342900" lvl="1" indent="-342900">
-              <a:spcAft>
-                <a:spcPts val="2000"/>
-              </a:spcAft>
-            </a:pPr>
-            <a:r>
-              <a:rPr lang="en-US" sz="2400" dirty="0" smtClean="0">
-                <a:effectLst/>
-              </a:rPr>
-              <a:t>The </a:t>
-            </a:r>
-            <a:r>
-              <a:rPr lang="en-US" sz="2400" dirty="0">
-                <a:effectLst/>
-              </a:rPr>
-              <a:t>primary function of a BGP </a:t>
-            </a:r>
-            <a:r>
-              <a:rPr lang="en-US" sz="2400" dirty="0" smtClean="0">
-                <a:effectLst/>
-              </a:rPr>
-              <a:t>speaker is </a:t>
-            </a:r>
-            <a:r>
-              <a:rPr lang="en-US" sz="2400" dirty="0">
-                <a:effectLst/>
-              </a:rPr>
-              <a:t>to exchange network reachability information with other BGP systems</a:t>
-            </a:r>
-            <a:r>
-              <a:rPr lang="en-US" sz="2400" dirty="0" smtClean="0">
-                <a:effectLst/>
-              </a:rPr>
-              <a:t>.</a:t>
-            </a:r>
-          </a:p>
-          <a:p>
-            <a:pPr marL="342900" lvl="1" indent="-342900">
-              <a:spcAft>
-                <a:spcPts val="2000"/>
-              </a:spcAft>
-            </a:pPr>
-            <a:r>
-              <a:rPr lang="en-US" sz="2400" dirty="0" smtClean="0"/>
-              <a:t>This is accomplished through use of the Best Path Selection Algorithm</a:t>
-            </a:r>
-          </a:p>
-          <a:p>
-            <a:pPr marL="580644" lvl="2" indent="-342900">
-              <a:spcAft>
-                <a:spcPts val="2000"/>
-              </a:spcAft>
-            </a:pPr>
-            <a:r>
-              <a:rPr lang="en-US" sz="2200" dirty="0" smtClean="0"/>
-              <a:t>Reducing </a:t>
-            </a:r>
-            <a:r>
-              <a:rPr lang="en-US" sz="2200" dirty="0"/>
-              <a:t>routing and forwarding changes in a network, creating a more stable network</a:t>
-            </a:r>
-          </a:p>
-          <a:p>
-            <a:pPr marL="580644" lvl="2" indent="-342900">
-              <a:spcAft>
-                <a:spcPts val="2000"/>
-              </a:spcAft>
-            </a:pPr>
-            <a:r>
-              <a:rPr lang="en-US" sz="2200" dirty="0"/>
-              <a:t>Quickly </a:t>
-            </a:r>
-            <a:r>
-              <a:rPr lang="en-US" sz="2200" dirty="0" smtClean="0"/>
-              <a:t>identifying </a:t>
-            </a:r>
-            <a:r>
-              <a:rPr lang="en-US" sz="2200" dirty="0"/>
-              <a:t>and </a:t>
-            </a:r>
-            <a:r>
-              <a:rPr lang="en-US" sz="2200" dirty="0" smtClean="0"/>
-              <a:t>removing </a:t>
-            </a:r>
-            <a:r>
-              <a:rPr lang="en-US" sz="2200" dirty="0"/>
-              <a:t>any routing loops</a:t>
-            </a:r>
-          </a:p>
-          <a:p>
-            <a:pPr marL="580644" lvl="2" indent="-342900">
-              <a:spcAft>
-                <a:spcPts val="2000"/>
-              </a:spcAft>
-            </a:pPr>
-            <a:r>
-              <a:rPr lang="en-US" sz="2200" dirty="0" smtClean="0"/>
-              <a:t>Enforcing </a:t>
-            </a:r>
-            <a:r>
-              <a:rPr lang="en-US" sz="2200" dirty="0"/>
-              <a:t>policy decisions</a:t>
-            </a:r>
-          </a:p>
-          <a:p>
-            <a:pPr marL="342900" lvl="1" indent="-342900">
-              <a:spcAft>
-                <a:spcPts val="2000"/>
-              </a:spcAft>
-            </a:pPr>
-            <a:endParaRPr lang="en-US" sz="2400" dirty="0" smtClean="0">
-              <a:solidFill>
-                <a:srgbClr val="FF0000"/>
-              </a:solidFill>
-            </a:endParaRPr>
-          </a:p>
-          <a:p>
+            <a:pPr lvl="1"/>
+            <a:r>
+              <a:rPr lang="en-US" dirty="0" smtClean="0"/>
+              <a:t>Message Format</a:t>
+            </a:r>
+          </a:p>
+          <a:p>
+            <a:pPr lvl="2"/>
+            <a:r>
+              <a:rPr lang="en-US" dirty="0" smtClean="0"/>
+              <a:t>Max size 4096 bytes; Smallest size 19 bytes (header and no data)</a:t>
+            </a:r>
+          </a:p>
+          <a:p>
+            <a:pPr lvl="2"/>
+            <a:r>
+              <a:rPr lang="en-US" dirty="0" smtClean="0"/>
+              <a:t>All fields are multi-byte fields are big-endian</a:t>
+            </a:r>
+          </a:p>
+          <a:p>
+            <a:pPr lvl="2"/>
+            <a:r>
+              <a:rPr lang="en-US" dirty="0" smtClean="0"/>
+              <a:t>4 types of BGP messages: Open, Update, Notification, and Keep Alive.</a:t>
+            </a:r>
             <a:endParaRPr lang="en-US" dirty="0"/>
           </a:p>
-        </p:txBody>
-      </p:sp>
-      <p:sp>
-        <p:nvSpPr>
-          <p:cNvPr id="4" name="Title 3"/>
+          <a:p>
+            <a:pPr lvl="1"/>
+            <a:r>
+              <a:rPr lang="en-US" dirty="0"/>
+              <a:t>Routing </a:t>
+            </a:r>
+            <a:r>
+              <a:rPr lang="en-US" dirty="0" smtClean="0"/>
+              <a:t>Updates</a:t>
+            </a:r>
+          </a:p>
+          <a:p>
+            <a:pPr lvl="2"/>
+            <a:r>
+              <a:rPr lang="en-US" dirty="0" smtClean="0"/>
+              <a:t>Entire routing table is sent when a peer/speaker boots</a:t>
+            </a:r>
+          </a:p>
+          <a:p>
+            <a:pPr lvl="2"/>
+            <a:r>
+              <a:rPr lang="en-US" dirty="0" smtClean="0"/>
+              <a:t>After boot only updates are sent</a:t>
+            </a:r>
+          </a:p>
+          <a:p>
+            <a:pPr lvl="2"/>
+            <a:r>
+              <a:rPr lang="en-US" dirty="0" smtClean="0"/>
+              <a:t>Route updates are stored in the Routing Information Base (RIB)</a:t>
+            </a:r>
+            <a:endParaRPr lang="en-US" dirty="0"/>
+          </a:p>
+          <a:p>
+            <a:pPr lvl="1"/>
+            <a:r>
+              <a:rPr lang="en-US" dirty="0"/>
+              <a:t>Path </a:t>
+            </a:r>
+            <a:r>
+              <a:rPr lang="en-US" dirty="0" smtClean="0"/>
+              <a:t>Attributes</a:t>
+            </a:r>
+          </a:p>
+          <a:p>
+            <a:pPr lvl="2"/>
+            <a:r>
+              <a:rPr lang="en-US" dirty="0" smtClean="0"/>
+              <a:t>AS_PATH – path that traverses the least number of AS.</a:t>
+            </a:r>
+          </a:p>
+          <a:p>
+            <a:pPr lvl="2"/>
+            <a:r>
+              <a:rPr lang="en-US" dirty="0" smtClean="0"/>
+              <a:t>MED – allows an exit point to be specified to a remote AS for a multi exit point network.</a:t>
+            </a:r>
+          </a:p>
+          <a:p>
+            <a:pPr lvl="2"/>
+            <a:r>
+              <a:rPr lang="en-US" dirty="0" smtClean="0"/>
+              <a:t>Origin – specifies the origin of a routing update; can be used in determining the preferred route</a:t>
+            </a:r>
+          </a:p>
+          <a:p>
+            <a:pPr lvl="1"/>
+            <a:r>
+              <a:rPr lang="en-US" dirty="0"/>
+              <a:t>Error Handling</a:t>
+            </a:r>
+          </a:p>
+          <a:p>
+            <a:pPr lvl="2"/>
+            <a:r>
+              <a:rPr lang="en-US" dirty="0"/>
+              <a:t>When an error occurs, a notification message with the following is sent:</a:t>
+            </a:r>
+          </a:p>
+          <a:p>
+            <a:pPr lvl="3"/>
+            <a:r>
+              <a:rPr lang="en-US" dirty="0"/>
+              <a:t>Error Code</a:t>
+            </a:r>
+          </a:p>
+          <a:p>
+            <a:pPr lvl="3"/>
+            <a:r>
+              <a:rPr lang="en-US" dirty="0"/>
+              <a:t>Error </a:t>
+            </a:r>
+            <a:r>
+              <a:rPr lang="en-US" dirty="0"/>
+              <a:t>Subcode</a:t>
+            </a:r>
+            <a:r>
+              <a:rPr lang="en-US" dirty="0"/>
+              <a:t> (0 if none specified)</a:t>
+            </a:r>
+          </a:p>
+          <a:p>
+            <a:pPr lvl="3"/>
+            <a:r>
+              <a:rPr lang="en-US" dirty="0" smtClean="0"/>
+              <a:t>Data fields</a:t>
+            </a:r>
+          </a:p>
+          <a:p>
+            <a:pPr lvl="2"/>
+            <a:r>
+              <a:rPr lang="en-US" dirty="0" smtClean="0"/>
+              <a:t>Routing </a:t>
+            </a:r>
+            <a:r>
+              <a:rPr lang="en-US" dirty="0"/>
+              <a:t>table entries </a:t>
+            </a:r>
+            <a:r>
+              <a:rPr lang="en-US" dirty="0" smtClean="0"/>
+              <a:t>errors associated </a:t>
+            </a:r>
+            <a:r>
+              <a:rPr lang="en-US" dirty="0"/>
+              <a:t>with remote BGP speakers are marked as </a:t>
+            </a:r>
+            <a:r>
+              <a:rPr lang="en-US" dirty="0" smtClean="0"/>
+              <a:t>invalid</a:t>
+            </a:r>
+            <a:endParaRPr lang="en-US" dirty="0"/>
+          </a:p>
+        </p:txBody>
+      </p:sp>
+      <p:sp>
+        <p:nvSpPr>
+          <p:cNvPr id="2" name="Title 1"/>
           <p:cNvSpPr>
             <a:spLocks noGrp="1"/>
           </p:cNvSpPr>
@@ -7374,7 +7082,7 @@
                   <a:srgbClr val="000090"/>
                 </a:solidFill>
               </a:rPr>
-              <a:t>Reasons for Implementation</a:t>
+              <a:t>Implementation of Standard</a:t>
             </a:r>
             <a:endParaRPr lang="en-US" dirty="0">
               <a:solidFill>
@@ -7387,7 +7095,7 @@
     </p:spTree>
     <p:extLst>
       <p:ext uri="{BB962C8B-B14F-4D97-AF65-F5344CB8AC3E}">
-        <p14:creationId xmlns:p14="http://schemas.microsoft.com/office/powerpoint/2010/main" val="726320851"/>
+        <p14:creationId xmlns:p14="http://schemas.microsoft.com/office/powerpoint/2010/main" val="1231550707"/>
       </p:ext>
     </p:extLst>
   </p:cSld>

</xml_diff>